<commit_message>
update mlp batch to 95.  Update to deck for comparison slide
update mlp batch to 95.  Update to deck for comparison slide
</commit_message>
<xml_diff>
--- a/FinalPresentation.pptx
+++ b/FinalPresentation.pptx
@@ -9193,7 +9193,7 @@
             <p:ph idx="1"/>
             <p:extLst>
               <p:ext uri="{D42A27DB-BD31-4B8C-83A1-F6EECF244321}">
-                <p14:modId xmlns:p14="http://schemas.microsoft.com/office/powerpoint/2010/main" val="1120453157"/>
+                <p14:modId xmlns:p14="http://schemas.microsoft.com/office/powerpoint/2010/main" val="3657642356"/>
               </p:ext>
             </p:extLst>
           </p:nvPr>
@@ -9395,7 +9395,7 @@
                             <a:schemeClr val="bg1"/>
                           </a:solidFill>
                         </a:rPr>
-                        <a:t>Rolling ASE (Training Size 91)</a:t>
+                        <a:t>Rolling ASE (Training Size 95)</a:t>
                       </a:r>
                     </a:p>
                   </a:txBody>
@@ -9569,7 +9569,7 @@
                       <a:pPr algn="ctr"/>
                       <a:r>
                         <a:rPr lang="en-US" dirty="0"/>
-                        <a:t>0.023</a:t>
+                        <a:t>0.152</a:t>
                       </a:r>
                     </a:p>
                   </a:txBody>
@@ -9725,7 +9725,7 @@
                       <a:pPr algn="ctr"/>
                       <a:r>
                         <a:rPr lang="en-US" dirty="0"/>
-                        <a:t>0.035</a:t>
+                        <a:t>0.133</a:t>
                       </a:r>
                     </a:p>
                   </a:txBody>
@@ -9876,9 +9876,10 @@
                     <a:p>
                       <a:pPr algn="ctr"/>
                       <a:r>
-                        <a:rPr lang="en-US" dirty="0"/>
-                        <a:t>0.070</a:t>
+                        <a:rPr lang="en-US"/>
+                        <a:t>0.071</a:t>
                       </a:r>
+                      <a:endParaRPr lang="en-US" dirty="0"/>
                     </a:p>
                   </a:txBody>
                   <a:tcPr>
@@ -10017,7 +10018,7 @@
                       <a:pPr algn="ctr"/>
                       <a:r>
                         <a:rPr lang="en-US" dirty="0"/>
-                        <a:t>0.187</a:t>
+                        <a:t>0.229</a:t>
                       </a:r>
                     </a:p>
                   </a:txBody>
@@ -10153,7 +10154,7 @@
                       <a:pPr algn="ctr"/>
                       <a:r>
                         <a:rPr lang="en-US" dirty="0"/>
-                        <a:t>0.446</a:t>
+                        <a:t>0.394</a:t>
                       </a:r>
                     </a:p>
                   </a:txBody>

</xml_diff>

<commit_message>
updating PPTs VAR forecast line
</commit_message>
<xml_diff>
--- a/FinalPresentation.pptx
+++ b/FinalPresentation.pptx
@@ -12,8 +12,8 @@
     <p:sldId id="580" r:id="rId3"/>
     <p:sldId id="593" r:id="rId4"/>
     <p:sldId id="260" r:id="rId5"/>
-    <p:sldId id="621" r:id="rId6"/>
-    <p:sldId id="609" r:id="rId7"/>
+    <p:sldId id="609" r:id="rId6"/>
+    <p:sldId id="621" r:id="rId7"/>
     <p:sldId id="605" r:id="rId8"/>
     <p:sldId id="612" r:id="rId9"/>
     <p:sldId id="603" r:id="rId10"/>
@@ -913,8 +913,8 @@
               <a:buChar char="-"/>
             </a:pPr>
             <a:r>
-              <a:rPr lang="en-US" dirty="0" err="1"/>
-              <a:t>Ensembel</a:t>
+              <a:rPr lang="en-US" dirty="0" smtClean="0"/>
+              <a:t>Ensemble</a:t>
             </a:r>
             <a:endParaRPr lang="en-US" dirty="0"/>
           </a:p>
@@ -942,13 +942,8 @@
             </a:pPr>
             <a:r>
               <a:rPr lang="en-US" dirty="0"/>
-              <a:t>This allows for more accurate ASEs as </a:t>
-            </a:r>
-            <a:r>
-              <a:rPr lang="en-US"/>
-              <a:t>they will </a:t>
-            </a:r>
-            <a:endParaRPr lang="en-US" dirty="0"/>
+              <a:t>This allows for more accurate ASEs as they will </a:t>
+            </a:r>
           </a:p>
           <a:p>
             <a:endParaRPr lang="en-US" dirty="0"/>
@@ -1545,14 +1540,89 @@
           <a:p>
             <a:r>
               <a:rPr lang="en-US" dirty="0"/>
-              <a:t>Stocks that were between $5-$50 that had spectral densities with exponentially damping were selected as their serial correlation structures can be captured easily with signal plus noise models</a:t>
-            </a:r>
-          </a:p>
-          <a:p>
+              <a:t>For our analysis we selected a non-stationary process</a:t>
+            </a:r>
+          </a:p>
+          <a:p>
+            <a:pPr marL="171450" indent="-171450">
+              <a:buFontTx/>
+              <a:buChar char="-"/>
+            </a:pPr>
             <a:r>
               <a:rPr lang="en-US" dirty="0"/>
-              <a:t>Additional features were created to capture the variation between open/close and high/low prices by subtracting the opening/high price from the close/low price</a:t>
-            </a:r>
+              <a:t>The preprocessing of the data allowed us to target data that would be non-stationary</a:t>
+            </a:r>
+          </a:p>
+          <a:p>
+            <a:pPr marL="171450" indent="-171450">
+              <a:buFontTx/>
+              <a:buChar char="-"/>
+            </a:pPr>
+            <a:r>
+              <a:rPr lang="en-US" dirty="0"/>
+              <a:t>This process resulted in us selecting Arch Capital Group Ltd. Stocks for analysis</a:t>
+            </a:r>
+          </a:p>
+          <a:p>
+            <a:pPr marL="171450" indent="-171450">
+              <a:buFontTx/>
+              <a:buChar char="-"/>
+            </a:pPr>
+            <a:endParaRPr lang="en-US" dirty="0"/>
+          </a:p>
+          <a:p>
+            <a:pPr marL="0" indent="0">
+              <a:buFontTx/>
+              <a:buNone/>
+            </a:pPr>
+            <a:r>
+              <a:rPr lang="en-US" dirty="0"/>
+              <a:t>We then checked the:</a:t>
+            </a:r>
+          </a:p>
+          <a:p>
+            <a:pPr marL="171450" indent="-171450">
+              <a:buFontTx/>
+              <a:buChar char="-"/>
+            </a:pPr>
+            <a:r>
+              <a:rPr lang="en-US" dirty="0"/>
+              <a:t>Realizations</a:t>
+            </a:r>
+          </a:p>
+          <a:p>
+            <a:pPr marL="171450" indent="-171450">
+              <a:buFontTx/>
+              <a:buChar char="-"/>
+            </a:pPr>
+            <a:r>
+              <a:rPr lang="en-US" dirty="0"/>
+              <a:t>ACFs</a:t>
+            </a:r>
+          </a:p>
+          <a:p>
+            <a:pPr marL="171450" indent="-171450">
+              <a:buFontTx/>
+              <a:buChar char="-"/>
+            </a:pPr>
+            <a:r>
+              <a:rPr lang="en-US" dirty="0"/>
+              <a:t>And Spectral Densities to confirm that the data was non-stationary</a:t>
+            </a:r>
+          </a:p>
+          <a:p>
+            <a:pPr marL="171450" indent="-171450">
+              <a:buFontTx/>
+              <a:buChar char="-"/>
+            </a:pPr>
+            <a:endParaRPr lang="en-US" dirty="0"/>
+          </a:p>
+          <a:p>
+            <a:pPr marL="0" indent="0">
+              <a:buFontTx/>
+              <a:buNone/>
+            </a:pPr>
+            <a:endParaRPr lang="en-US" dirty="0"/>
           </a:p>
         </p:txBody>
       </p:sp>
@@ -1582,7 +1652,7 @@
     </p:spTree>
     <p:extLst>
       <p:ext uri="{BB962C8B-B14F-4D97-AF65-F5344CB8AC3E}">
-        <p14:creationId xmlns:p14="http://schemas.microsoft.com/office/powerpoint/2010/main" val="3652259482"/>
+        <p14:creationId xmlns:p14="http://schemas.microsoft.com/office/powerpoint/2010/main" val="240688670"/>
       </p:ext>
     </p:extLst>
   </p:cSld>
@@ -1638,89 +1708,14 @@
           <a:p>
             <a:r>
               <a:rPr lang="en-US" dirty="0"/>
-              <a:t>For our analysis we selected a non-stationary process</a:t>
-            </a:r>
-          </a:p>
-          <a:p>
-            <a:pPr marL="171450" indent="-171450">
-              <a:buFontTx/>
-              <a:buChar char="-"/>
-            </a:pPr>
+              <a:t>Stocks that were between $5-$50 that had spectral densities with exponentially damping were selected as their serial correlation structures can be captured easily with signal plus noise models</a:t>
+            </a:r>
+          </a:p>
+          <a:p>
             <a:r>
               <a:rPr lang="en-US" dirty="0"/>
-              <a:t>The preprocessing of the data allowed us to target data that would be non-stationary</a:t>
-            </a:r>
-          </a:p>
-          <a:p>
-            <a:pPr marL="171450" indent="-171450">
-              <a:buFontTx/>
-              <a:buChar char="-"/>
-            </a:pPr>
-            <a:r>
-              <a:rPr lang="en-US" dirty="0"/>
-              <a:t>This process resulted in us selecting Arch Capital Group Ltd. Stocks for analysis</a:t>
-            </a:r>
-          </a:p>
-          <a:p>
-            <a:pPr marL="171450" indent="-171450">
-              <a:buFontTx/>
-              <a:buChar char="-"/>
-            </a:pPr>
-            <a:endParaRPr lang="en-US" dirty="0"/>
-          </a:p>
-          <a:p>
-            <a:pPr marL="0" indent="0">
-              <a:buFontTx/>
-              <a:buNone/>
-            </a:pPr>
-            <a:r>
-              <a:rPr lang="en-US" dirty="0"/>
-              <a:t>We then checked the:</a:t>
-            </a:r>
-          </a:p>
-          <a:p>
-            <a:pPr marL="171450" indent="-171450">
-              <a:buFontTx/>
-              <a:buChar char="-"/>
-            </a:pPr>
-            <a:r>
-              <a:rPr lang="en-US" dirty="0"/>
-              <a:t>Realizations</a:t>
-            </a:r>
-          </a:p>
-          <a:p>
-            <a:pPr marL="171450" indent="-171450">
-              <a:buFontTx/>
-              <a:buChar char="-"/>
-            </a:pPr>
-            <a:r>
-              <a:rPr lang="en-US" dirty="0"/>
-              <a:t>ACFs</a:t>
-            </a:r>
-          </a:p>
-          <a:p>
-            <a:pPr marL="171450" indent="-171450">
-              <a:buFontTx/>
-              <a:buChar char="-"/>
-            </a:pPr>
-            <a:r>
-              <a:rPr lang="en-US" dirty="0"/>
-              <a:t>And Spectral Densities to confirm that the data was non-stationary</a:t>
-            </a:r>
-          </a:p>
-          <a:p>
-            <a:pPr marL="171450" indent="-171450">
-              <a:buFontTx/>
-              <a:buChar char="-"/>
-            </a:pPr>
-            <a:endParaRPr lang="en-US" dirty="0"/>
-          </a:p>
-          <a:p>
-            <a:pPr marL="0" indent="0">
-              <a:buFontTx/>
-              <a:buNone/>
-            </a:pPr>
-            <a:endParaRPr lang="en-US" dirty="0"/>
+              <a:t>Additional features were created to capture the variation between open/close and high/low prices by subtracting the opening/high price from the close/low price</a:t>
+            </a:r>
           </a:p>
         </p:txBody>
       </p:sp>
@@ -1750,7 +1745,7 @@
     </p:spTree>
     <p:extLst>
       <p:ext uri="{BB962C8B-B14F-4D97-AF65-F5344CB8AC3E}">
-        <p14:creationId xmlns:p14="http://schemas.microsoft.com/office/powerpoint/2010/main" val="240688670"/>
+        <p14:creationId xmlns:p14="http://schemas.microsoft.com/office/powerpoint/2010/main" val="3652259482"/>
       </p:ext>
     </p:extLst>
   </p:cSld>
@@ -2824,7 +2819,7 @@
           <p:cNvPr id="2" name="Title 1">
             <a:extLst>
               <a:ext uri="{FF2B5EF4-FFF2-40B4-BE49-F238E27FC236}">
-                <a16:creationId xmlns:a16="http://schemas.microsoft.com/office/drawing/2014/main" id="{96E13C99-700B-4438-ABD5-1133F6AC2A81}"/>
+                <a16:creationId xmlns:a16="http://schemas.microsoft.com/office/drawing/2014/main" xmlns="" id="{96E13C99-700B-4438-ABD5-1133F6AC2A81}"/>
               </a:ext>
             </a:extLst>
           </p:cNvPr>
@@ -2861,7 +2856,7 @@
           <p:cNvPr id="3" name="Subtitle 2">
             <a:extLst>
               <a:ext uri="{FF2B5EF4-FFF2-40B4-BE49-F238E27FC236}">
-                <a16:creationId xmlns:a16="http://schemas.microsoft.com/office/drawing/2014/main" id="{A00A5ABD-AADB-45D0-B064-7926BD74465C}"/>
+                <a16:creationId xmlns:a16="http://schemas.microsoft.com/office/drawing/2014/main" xmlns="" id="{A00A5ABD-AADB-45D0-B064-7926BD74465C}"/>
               </a:ext>
             </a:extLst>
           </p:cNvPr>
@@ -2931,7 +2926,7 @@
           <p:cNvPr id="4" name="Date Placeholder 3">
             <a:extLst>
               <a:ext uri="{FF2B5EF4-FFF2-40B4-BE49-F238E27FC236}">
-                <a16:creationId xmlns:a16="http://schemas.microsoft.com/office/drawing/2014/main" id="{5E179944-20A4-4290-8F3C-2DD9B8A6E290}"/>
+                <a16:creationId xmlns:a16="http://schemas.microsoft.com/office/drawing/2014/main" xmlns="" id="{5E179944-20A4-4290-8F3C-2DD9B8A6E290}"/>
               </a:ext>
             </a:extLst>
           </p:cNvPr>
@@ -2960,7 +2955,7 @@
           <p:cNvPr id="5" name="Footer Placeholder 4">
             <a:extLst>
               <a:ext uri="{FF2B5EF4-FFF2-40B4-BE49-F238E27FC236}">
-                <a16:creationId xmlns:a16="http://schemas.microsoft.com/office/drawing/2014/main" id="{5B519308-76AF-4B54-8506-B03D3949262E}"/>
+                <a16:creationId xmlns:a16="http://schemas.microsoft.com/office/drawing/2014/main" xmlns="" id="{5B519308-76AF-4B54-8506-B03D3949262E}"/>
               </a:ext>
             </a:extLst>
           </p:cNvPr>
@@ -2985,7 +2980,7 @@
           <p:cNvPr id="6" name="Slide Number Placeholder 5">
             <a:extLst>
               <a:ext uri="{FF2B5EF4-FFF2-40B4-BE49-F238E27FC236}">
-                <a16:creationId xmlns:a16="http://schemas.microsoft.com/office/drawing/2014/main" id="{C43CAC2D-C9E1-4558-8DCE-EDD3EC0E544B}"/>
+                <a16:creationId xmlns:a16="http://schemas.microsoft.com/office/drawing/2014/main" xmlns="" id="{C43CAC2D-C9E1-4558-8DCE-EDD3EC0E544B}"/>
               </a:ext>
             </a:extLst>
           </p:cNvPr>
@@ -3014,7 +3009,7 @@
           <p:cNvPr id="7" name="Straight Connector 6">
             <a:extLst>
               <a:ext uri="{FF2B5EF4-FFF2-40B4-BE49-F238E27FC236}">
-                <a16:creationId xmlns:a16="http://schemas.microsoft.com/office/drawing/2014/main" id="{0EC62AA3-1D21-4324-A662-F148648192A0}"/>
+                <a16:creationId xmlns:a16="http://schemas.microsoft.com/office/drawing/2014/main" xmlns="" id="{0EC62AA3-1D21-4324-A662-F148648192A0}"/>
               </a:ext>
             </a:extLst>
           </p:cNvPr>
@@ -3055,7 +3050,7 @@
           <p:cNvPr id="8" name="Picture 2" descr="C:\Users\njones\Dropbox (2U)\Work\Designing Slides\SMU\Design Brief\logo\logo_datasci_SMU.png">
             <a:extLst>
               <a:ext uri="{FF2B5EF4-FFF2-40B4-BE49-F238E27FC236}">
-                <a16:creationId xmlns:a16="http://schemas.microsoft.com/office/drawing/2014/main" id="{3AE5E602-45DD-41AF-A5AE-5B60603FE5A1}"/>
+                <a16:creationId xmlns:a16="http://schemas.microsoft.com/office/drawing/2014/main" xmlns="" id="{3AE5E602-45DD-41AF-A5AE-5B60603FE5A1}"/>
               </a:ext>
             </a:extLst>
           </p:cNvPr>
@@ -3132,7 +3127,7 @@
           <p:cNvPr id="2" name="Title 1">
             <a:extLst>
               <a:ext uri="{FF2B5EF4-FFF2-40B4-BE49-F238E27FC236}">
-                <a16:creationId xmlns:a16="http://schemas.microsoft.com/office/drawing/2014/main" id="{62762E2A-B5CA-42B4-BF42-DC3370648494}"/>
+                <a16:creationId xmlns:a16="http://schemas.microsoft.com/office/drawing/2014/main" xmlns="" id="{62762E2A-B5CA-42B4-BF42-DC3370648494}"/>
               </a:ext>
             </a:extLst>
           </p:cNvPr>
@@ -3160,7 +3155,7 @@
           <p:cNvPr id="3" name="Content Placeholder 2">
             <a:extLst>
               <a:ext uri="{FF2B5EF4-FFF2-40B4-BE49-F238E27FC236}">
-                <a16:creationId xmlns:a16="http://schemas.microsoft.com/office/drawing/2014/main" id="{14797549-3E35-46D3-8E19-14B57BC0D0E2}"/>
+                <a16:creationId xmlns:a16="http://schemas.microsoft.com/office/drawing/2014/main" xmlns="" id="{14797549-3E35-46D3-8E19-14B57BC0D0E2}"/>
               </a:ext>
             </a:extLst>
           </p:cNvPr>
@@ -3217,7 +3212,7 @@
           <p:cNvPr id="4" name="Date Placeholder 3">
             <a:extLst>
               <a:ext uri="{FF2B5EF4-FFF2-40B4-BE49-F238E27FC236}">
-                <a16:creationId xmlns:a16="http://schemas.microsoft.com/office/drawing/2014/main" id="{8DB2B248-1A85-4FFE-8A2D-FC080CB6C3BA}"/>
+                <a16:creationId xmlns:a16="http://schemas.microsoft.com/office/drawing/2014/main" xmlns="" id="{8DB2B248-1A85-4FFE-8A2D-FC080CB6C3BA}"/>
               </a:ext>
             </a:extLst>
           </p:cNvPr>
@@ -3246,7 +3241,7 @@
           <p:cNvPr id="5" name="Footer Placeholder 4">
             <a:extLst>
               <a:ext uri="{FF2B5EF4-FFF2-40B4-BE49-F238E27FC236}">
-                <a16:creationId xmlns:a16="http://schemas.microsoft.com/office/drawing/2014/main" id="{24A12DB7-FDB3-446D-AD35-5BAD38B70BCD}"/>
+                <a16:creationId xmlns:a16="http://schemas.microsoft.com/office/drawing/2014/main" xmlns="" id="{24A12DB7-FDB3-446D-AD35-5BAD38B70BCD}"/>
               </a:ext>
             </a:extLst>
           </p:cNvPr>
@@ -3271,7 +3266,7 @@
           <p:cNvPr id="6" name="Slide Number Placeholder 5">
             <a:extLst>
               <a:ext uri="{FF2B5EF4-FFF2-40B4-BE49-F238E27FC236}">
-                <a16:creationId xmlns:a16="http://schemas.microsoft.com/office/drawing/2014/main" id="{51A84FAD-99F7-4AE0-BA7D-0091A660B553}"/>
+                <a16:creationId xmlns:a16="http://schemas.microsoft.com/office/drawing/2014/main" xmlns="" id="{51A84FAD-99F7-4AE0-BA7D-0091A660B553}"/>
               </a:ext>
             </a:extLst>
           </p:cNvPr>
@@ -3300,7 +3295,7 @@
           <p:cNvPr id="7" name="Straight Connector 6">
             <a:extLst>
               <a:ext uri="{FF2B5EF4-FFF2-40B4-BE49-F238E27FC236}">
-                <a16:creationId xmlns:a16="http://schemas.microsoft.com/office/drawing/2014/main" id="{D2E47137-8587-46AF-9FD1-E3C0CBF87382}"/>
+                <a16:creationId xmlns:a16="http://schemas.microsoft.com/office/drawing/2014/main" xmlns="" id="{D2E47137-8587-46AF-9FD1-E3C0CBF87382}"/>
               </a:ext>
             </a:extLst>
           </p:cNvPr>
@@ -3371,7 +3366,7 @@
           <p:cNvPr id="2" name="Title 1">
             <a:extLst>
               <a:ext uri="{FF2B5EF4-FFF2-40B4-BE49-F238E27FC236}">
-                <a16:creationId xmlns:a16="http://schemas.microsoft.com/office/drawing/2014/main" id="{C017A7B2-5DCA-4838-895A-842DDB1AD45E}"/>
+                <a16:creationId xmlns:a16="http://schemas.microsoft.com/office/drawing/2014/main" xmlns="" id="{C017A7B2-5DCA-4838-895A-842DDB1AD45E}"/>
               </a:ext>
             </a:extLst>
           </p:cNvPr>
@@ -3408,7 +3403,7 @@
           <p:cNvPr id="3" name="Text Placeholder 2">
             <a:extLst>
               <a:ext uri="{FF2B5EF4-FFF2-40B4-BE49-F238E27FC236}">
-                <a16:creationId xmlns:a16="http://schemas.microsoft.com/office/drawing/2014/main" id="{DF559FE1-0C55-447D-B6C7-9D1F874F5C09}"/>
+                <a16:creationId xmlns:a16="http://schemas.microsoft.com/office/drawing/2014/main" xmlns="" id="{DF559FE1-0C55-447D-B6C7-9D1F874F5C09}"/>
               </a:ext>
             </a:extLst>
           </p:cNvPr>
@@ -3533,7 +3528,7 @@
           <p:cNvPr id="4" name="Date Placeholder 3">
             <a:extLst>
               <a:ext uri="{FF2B5EF4-FFF2-40B4-BE49-F238E27FC236}">
-                <a16:creationId xmlns:a16="http://schemas.microsoft.com/office/drawing/2014/main" id="{F1B7C85C-1BF1-4950-B43A-59AD5269A9F0}"/>
+                <a16:creationId xmlns:a16="http://schemas.microsoft.com/office/drawing/2014/main" xmlns="" id="{F1B7C85C-1BF1-4950-B43A-59AD5269A9F0}"/>
               </a:ext>
             </a:extLst>
           </p:cNvPr>
@@ -3562,7 +3557,7 @@
           <p:cNvPr id="5" name="Footer Placeholder 4">
             <a:extLst>
               <a:ext uri="{FF2B5EF4-FFF2-40B4-BE49-F238E27FC236}">
-                <a16:creationId xmlns:a16="http://schemas.microsoft.com/office/drawing/2014/main" id="{568F2E04-3CB8-4938-AF27-5931DF06D740}"/>
+                <a16:creationId xmlns:a16="http://schemas.microsoft.com/office/drawing/2014/main" xmlns="" id="{568F2E04-3CB8-4938-AF27-5931DF06D740}"/>
               </a:ext>
             </a:extLst>
           </p:cNvPr>
@@ -3587,7 +3582,7 @@
           <p:cNvPr id="6" name="Slide Number Placeholder 5">
             <a:extLst>
               <a:ext uri="{FF2B5EF4-FFF2-40B4-BE49-F238E27FC236}">
-                <a16:creationId xmlns:a16="http://schemas.microsoft.com/office/drawing/2014/main" id="{293CBD6E-211B-4A03-AF4D-6181280D8199}"/>
+                <a16:creationId xmlns:a16="http://schemas.microsoft.com/office/drawing/2014/main" xmlns="" id="{293CBD6E-211B-4A03-AF4D-6181280D8199}"/>
               </a:ext>
             </a:extLst>
           </p:cNvPr>
@@ -3647,7 +3642,7 @@
           <p:cNvPr id="2" name="Title 1">
             <a:extLst>
               <a:ext uri="{FF2B5EF4-FFF2-40B4-BE49-F238E27FC236}">
-                <a16:creationId xmlns:a16="http://schemas.microsoft.com/office/drawing/2014/main" id="{3C4CF13E-51F4-4B90-8092-1994733A6395}"/>
+                <a16:creationId xmlns:a16="http://schemas.microsoft.com/office/drawing/2014/main" xmlns="" id="{3C4CF13E-51F4-4B90-8092-1994733A6395}"/>
               </a:ext>
             </a:extLst>
           </p:cNvPr>
@@ -3675,7 +3670,7 @@
           <p:cNvPr id="3" name="Content Placeholder 2">
             <a:extLst>
               <a:ext uri="{FF2B5EF4-FFF2-40B4-BE49-F238E27FC236}">
-                <a16:creationId xmlns:a16="http://schemas.microsoft.com/office/drawing/2014/main" id="{DF22BCDD-C476-4DA0-973D-B2CAB9467A5F}"/>
+                <a16:creationId xmlns:a16="http://schemas.microsoft.com/office/drawing/2014/main" xmlns="" id="{DF22BCDD-C476-4DA0-973D-B2CAB9467A5F}"/>
               </a:ext>
             </a:extLst>
           </p:cNvPr>
@@ -3737,7 +3732,7 @@
           <p:cNvPr id="4" name="Content Placeholder 3">
             <a:extLst>
               <a:ext uri="{FF2B5EF4-FFF2-40B4-BE49-F238E27FC236}">
-                <a16:creationId xmlns:a16="http://schemas.microsoft.com/office/drawing/2014/main" id="{C9405961-7FE0-4A2E-86ED-2FE8BE9AA1A0}"/>
+                <a16:creationId xmlns:a16="http://schemas.microsoft.com/office/drawing/2014/main" xmlns="" id="{C9405961-7FE0-4A2E-86ED-2FE8BE9AA1A0}"/>
               </a:ext>
             </a:extLst>
           </p:cNvPr>
@@ -3799,7 +3794,7 @@
           <p:cNvPr id="5" name="Date Placeholder 4">
             <a:extLst>
               <a:ext uri="{FF2B5EF4-FFF2-40B4-BE49-F238E27FC236}">
-                <a16:creationId xmlns:a16="http://schemas.microsoft.com/office/drawing/2014/main" id="{485BD408-AF47-4882-97A4-F63E724B77FC}"/>
+                <a16:creationId xmlns:a16="http://schemas.microsoft.com/office/drawing/2014/main" xmlns="" id="{485BD408-AF47-4882-97A4-F63E724B77FC}"/>
               </a:ext>
             </a:extLst>
           </p:cNvPr>
@@ -3828,7 +3823,7 @@
           <p:cNvPr id="6" name="Footer Placeholder 5">
             <a:extLst>
               <a:ext uri="{FF2B5EF4-FFF2-40B4-BE49-F238E27FC236}">
-                <a16:creationId xmlns:a16="http://schemas.microsoft.com/office/drawing/2014/main" id="{D0693D62-073D-4844-8649-2A5910B15359}"/>
+                <a16:creationId xmlns:a16="http://schemas.microsoft.com/office/drawing/2014/main" xmlns="" id="{D0693D62-073D-4844-8649-2A5910B15359}"/>
               </a:ext>
             </a:extLst>
           </p:cNvPr>
@@ -3853,7 +3848,7 @@
           <p:cNvPr id="7" name="Slide Number Placeholder 6">
             <a:extLst>
               <a:ext uri="{FF2B5EF4-FFF2-40B4-BE49-F238E27FC236}">
-                <a16:creationId xmlns:a16="http://schemas.microsoft.com/office/drawing/2014/main" id="{7F2AB4B2-7B06-4F2F-AA1F-0B481AA8C360}"/>
+                <a16:creationId xmlns:a16="http://schemas.microsoft.com/office/drawing/2014/main" xmlns="" id="{7F2AB4B2-7B06-4F2F-AA1F-0B481AA8C360}"/>
               </a:ext>
             </a:extLst>
           </p:cNvPr>
@@ -3882,7 +3877,7 @@
           <p:cNvPr id="8" name="Straight Connector 7">
             <a:extLst>
               <a:ext uri="{FF2B5EF4-FFF2-40B4-BE49-F238E27FC236}">
-                <a16:creationId xmlns:a16="http://schemas.microsoft.com/office/drawing/2014/main" id="{6130423A-8A35-4D2F-859E-5DF2142AEB4D}"/>
+                <a16:creationId xmlns:a16="http://schemas.microsoft.com/office/drawing/2014/main" xmlns="" id="{6130423A-8A35-4D2F-859E-5DF2142AEB4D}"/>
               </a:ext>
             </a:extLst>
           </p:cNvPr>
@@ -3953,7 +3948,7 @@
           <p:cNvPr id="2" name="Title 1">
             <a:extLst>
               <a:ext uri="{FF2B5EF4-FFF2-40B4-BE49-F238E27FC236}">
-                <a16:creationId xmlns:a16="http://schemas.microsoft.com/office/drawing/2014/main" id="{7144F659-6DA8-409E-8B64-1F77EF8562BF}"/>
+                <a16:creationId xmlns:a16="http://schemas.microsoft.com/office/drawing/2014/main" xmlns="" id="{7144F659-6DA8-409E-8B64-1F77EF8562BF}"/>
               </a:ext>
             </a:extLst>
           </p:cNvPr>
@@ -3986,7 +3981,7 @@
           <p:cNvPr id="3" name="Text Placeholder 2">
             <a:extLst>
               <a:ext uri="{FF2B5EF4-FFF2-40B4-BE49-F238E27FC236}">
-                <a16:creationId xmlns:a16="http://schemas.microsoft.com/office/drawing/2014/main" id="{C358C77B-FE05-48CC-9BDF-0D5BF396C5F0}"/>
+                <a16:creationId xmlns:a16="http://schemas.microsoft.com/office/drawing/2014/main" xmlns="" id="{C358C77B-FE05-48CC-9BDF-0D5BF396C5F0}"/>
               </a:ext>
             </a:extLst>
           </p:cNvPr>
@@ -4057,7 +4052,7 @@
           <p:cNvPr id="4" name="Content Placeholder 3">
             <a:extLst>
               <a:ext uri="{FF2B5EF4-FFF2-40B4-BE49-F238E27FC236}">
-                <a16:creationId xmlns:a16="http://schemas.microsoft.com/office/drawing/2014/main" id="{E41F2205-FC3B-4060-80E0-DA742A0BA989}"/>
+                <a16:creationId xmlns:a16="http://schemas.microsoft.com/office/drawing/2014/main" xmlns="" id="{E41F2205-FC3B-4060-80E0-DA742A0BA989}"/>
               </a:ext>
             </a:extLst>
           </p:cNvPr>
@@ -4119,7 +4114,7 @@
           <p:cNvPr id="5" name="Text Placeholder 4">
             <a:extLst>
               <a:ext uri="{FF2B5EF4-FFF2-40B4-BE49-F238E27FC236}">
-                <a16:creationId xmlns:a16="http://schemas.microsoft.com/office/drawing/2014/main" id="{C4E4CA06-C864-46EF-B8F0-236C8E63CE3E}"/>
+                <a16:creationId xmlns:a16="http://schemas.microsoft.com/office/drawing/2014/main" xmlns="" id="{C4E4CA06-C864-46EF-B8F0-236C8E63CE3E}"/>
               </a:ext>
             </a:extLst>
           </p:cNvPr>
@@ -4190,7 +4185,7 @@
           <p:cNvPr id="6" name="Content Placeholder 5">
             <a:extLst>
               <a:ext uri="{FF2B5EF4-FFF2-40B4-BE49-F238E27FC236}">
-                <a16:creationId xmlns:a16="http://schemas.microsoft.com/office/drawing/2014/main" id="{634CA3E9-B83C-400E-A4F9-1F7E0FE1A724}"/>
+                <a16:creationId xmlns:a16="http://schemas.microsoft.com/office/drawing/2014/main" xmlns="" id="{634CA3E9-B83C-400E-A4F9-1F7E0FE1A724}"/>
               </a:ext>
             </a:extLst>
           </p:cNvPr>
@@ -4252,7 +4247,7 @@
           <p:cNvPr id="7" name="Date Placeholder 6">
             <a:extLst>
               <a:ext uri="{FF2B5EF4-FFF2-40B4-BE49-F238E27FC236}">
-                <a16:creationId xmlns:a16="http://schemas.microsoft.com/office/drawing/2014/main" id="{416B7495-F980-4E4F-A1AA-BEA448EBC5BB}"/>
+                <a16:creationId xmlns:a16="http://schemas.microsoft.com/office/drawing/2014/main" xmlns="" id="{416B7495-F980-4E4F-A1AA-BEA448EBC5BB}"/>
               </a:ext>
             </a:extLst>
           </p:cNvPr>
@@ -4281,7 +4276,7 @@
           <p:cNvPr id="8" name="Footer Placeholder 7">
             <a:extLst>
               <a:ext uri="{FF2B5EF4-FFF2-40B4-BE49-F238E27FC236}">
-                <a16:creationId xmlns:a16="http://schemas.microsoft.com/office/drawing/2014/main" id="{2A41ABE2-6179-4E88-B875-6A3C6A0CF2CF}"/>
+                <a16:creationId xmlns:a16="http://schemas.microsoft.com/office/drawing/2014/main" xmlns="" id="{2A41ABE2-6179-4E88-B875-6A3C6A0CF2CF}"/>
               </a:ext>
             </a:extLst>
           </p:cNvPr>
@@ -4306,7 +4301,7 @@
           <p:cNvPr id="9" name="Slide Number Placeholder 8">
             <a:extLst>
               <a:ext uri="{FF2B5EF4-FFF2-40B4-BE49-F238E27FC236}">
-                <a16:creationId xmlns:a16="http://schemas.microsoft.com/office/drawing/2014/main" id="{CDD045FA-1884-4059-9051-E53A8607DE2E}"/>
+                <a16:creationId xmlns:a16="http://schemas.microsoft.com/office/drawing/2014/main" xmlns="" id="{CDD045FA-1884-4059-9051-E53A8607DE2E}"/>
               </a:ext>
             </a:extLst>
           </p:cNvPr>
@@ -4335,7 +4330,7 @@
           <p:cNvPr id="10" name="Straight Connector 9">
             <a:extLst>
               <a:ext uri="{FF2B5EF4-FFF2-40B4-BE49-F238E27FC236}">
-                <a16:creationId xmlns:a16="http://schemas.microsoft.com/office/drawing/2014/main" id="{1D4E4AE4-42BB-4247-9A9A-B642E6994745}"/>
+                <a16:creationId xmlns:a16="http://schemas.microsoft.com/office/drawing/2014/main" xmlns="" id="{1D4E4AE4-42BB-4247-9A9A-B642E6994745}"/>
               </a:ext>
             </a:extLst>
           </p:cNvPr>
@@ -4406,7 +4401,7 @@
           <p:cNvPr id="2" name="Title 1">
             <a:extLst>
               <a:ext uri="{FF2B5EF4-FFF2-40B4-BE49-F238E27FC236}">
-                <a16:creationId xmlns:a16="http://schemas.microsoft.com/office/drawing/2014/main" id="{6F7EB8E5-A929-4F2E-87F8-B1BF4055C3DC}"/>
+                <a16:creationId xmlns:a16="http://schemas.microsoft.com/office/drawing/2014/main" xmlns="" id="{6F7EB8E5-A929-4F2E-87F8-B1BF4055C3DC}"/>
               </a:ext>
             </a:extLst>
           </p:cNvPr>
@@ -4434,7 +4429,7 @@
           <p:cNvPr id="3" name="Date Placeholder 2">
             <a:extLst>
               <a:ext uri="{FF2B5EF4-FFF2-40B4-BE49-F238E27FC236}">
-                <a16:creationId xmlns:a16="http://schemas.microsoft.com/office/drawing/2014/main" id="{B9B4D636-CFD1-408F-BB1C-F8F56960EF73}"/>
+                <a16:creationId xmlns:a16="http://schemas.microsoft.com/office/drawing/2014/main" xmlns="" id="{B9B4D636-CFD1-408F-BB1C-F8F56960EF73}"/>
               </a:ext>
             </a:extLst>
           </p:cNvPr>
@@ -4463,7 +4458,7 @@
           <p:cNvPr id="4" name="Footer Placeholder 3">
             <a:extLst>
               <a:ext uri="{FF2B5EF4-FFF2-40B4-BE49-F238E27FC236}">
-                <a16:creationId xmlns:a16="http://schemas.microsoft.com/office/drawing/2014/main" id="{9D1B00F6-1555-48FA-80AB-DFFE7122BCD6}"/>
+                <a16:creationId xmlns:a16="http://schemas.microsoft.com/office/drawing/2014/main" xmlns="" id="{9D1B00F6-1555-48FA-80AB-DFFE7122BCD6}"/>
               </a:ext>
             </a:extLst>
           </p:cNvPr>
@@ -4488,7 +4483,7 @@
           <p:cNvPr id="5" name="Slide Number Placeholder 4">
             <a:extLst>
               <a:ext uri="{FF2B5EF4-FFF2-40B4-BE49-F238E27FC236}">
-                <a16:creationId xmlns:a16="http://schemas.microsoft.com/office/drawing/2014/main" id="{CC6C2D28-2E3C-4475-922E-9E6E3F7B81EF}"/>
+                <a16:creationId xmlns:a16="http://schemas.microsoft.com/office/drawing/2014/main" xmlns="" id="{CC6C2D28-2E3C-4475-922E-9E6E3F7B81EF}"/>
               </a:ext>
             </a:extLst>
           </p:cNvPr>
@@ -4547,7 +4542,7 @@
           <p:cNvPr id="2" name="Date Placeholder 1">
             <a:extLst>
               <a:ext uri="{FF2B5EF4-FFF2-40B4-BE49-F238E27FC236}">
-                <a16:creationId xmlns:a16="http://schemas.microsoft.com/office/drawing/2014/main" id="{FF033503-9E53-412D-B439-820FCB965B16}"/>
+                <a16:creationId xmlns:a16="http://schemas.microsoft.com/office/drawing/2014/main" xmlns="" id="{FF033503-9E53-412D-B439-820FCB965B16}"/>
               </a:ext>
             </a:extLst>
           </p:cNvPr>
@@ -4576,7 +4571,7 @@
           <p:cNvPr id="3" name="Footer Placeholder 2">
             <a:extLst>
               <a:ext uri="{FF2B5EF4-FFF2-40B4-BE49-F238E27FC236}">
-                <a16:creationId xmlns:a16="http://schemas.microsoft.com/office/drawing/2014/main" id="{5661269A-6A46-4710-9D0E-82E244722132}"/>
+                <a16:creationId xmlns:a16="http://schemas.microsoft.com/office/drawing/2014/main" xmlns="" id="{5661269A-6A46-4710-9D0E-82E244722132}"/>
               </a:ext>
             </a:extLst>
           </p:cNvPr>
@@ -4601,7 +4596,7 @@
           <p:cNvPr id="4" name="Slide Number Placeholder 3">
             <a:extLst>
               <a:ext uri="{FF2B5EF4-FFF2-40B4-BE49-F238E27FC236}">
-                <a16:creationId xmlns:a16="http://schemas.microsoft.com/office/drawing/2014/main" id="{ADBE1E59-5C51-42CE-A8C0-83A6ECA72292}"/>
+                <a16:creationId xmlns:a16="http://schemas.microsoft.com/office/drawing/2014/main" xmlns="" id="{ADBE1E59-5C51-42CE-A8C0-83A6ECA72292}"/>
               </a:ext>
             </a:extLst>
           </p:cNvPr>
@@ -4630,7 +4625,7 @@
           <p:cNvPr id="5" name="Picture 2" descr="C:\Users\njones\Dropbox (2U)\Work\Designing Slides\SMU\Design Brief\logo\logo_datasci_SMU.png">
             <a:extLst>
               <a:ext uri="{FF2B5EF4-FFF2-40B4-BE49-F238E27FC236}">
-                <a16:creationId xmlns:a16="http://schemas.microsoft.com/office/drawing/2014/main" id="{CAB93218-3890-43BA-AC23-AD4892919D43}"/>
+                <a16:creationId xmlns:a16="http://schemas.microsoft.com/office/drawing/2014/main" xmlns="" id="{CAB93218-3890-43BA-AC23-AD4892919D43}"/>
               </a:ext>
             </a:extLst>
           </p:cNvPr>
@@ -4707,7 +4702,7 @@
           <p:cNvPr id="2" name="Title 1">
             <a:extLst>
               <a:ext uri="{FF2B5EF4-FFF2-40B4-BE49-F238E27FC236}">
-                <a16:creationId xmlns:a16="http://schemas.microsoft.com/office/drawing/2014/main" id="{9573BD60-4815-46DA-A10F-BC3CEC304006}"/>
+                <a16:creationId xmlns:a16="http://schemas.microsoft.com/office/drawing/2014/main" xmlns="" id="{9573BD60-4815-46DA-A10F-BC3CEC304006}"/>
               </a:ext>
             </a:extLst>
           </p:cNvPr>
@@ -4744,7 +4739,7 @@
           <p:cNvPr id="3" name="Content Placeholder 2">
             <a:extLst>
               <a:ext uri="{FF2B5EF4-FFF2-40B4-BE49-F238E27FC236}">
-                <a16:creationId xmlns:a16="http://schemas.microsoft.com/office/drawing/2014/main" id="{71D465B9-7198-4E83-BE88-50835B2C5C07}"/>
+                <a16:creationId xmlns:a16="http://schemas.microsoft.com/office/drawing/2014/main" xmlns="" id="{71D465B9-7198-4E83-BE88-50835B2C5C07}"/>
               </a:ext>
             </a:extLst>
           </p:cNvPr>
@@ -4834,7 +4829,7 @@
           <p:cNvPr id="4" name="Text Placeholder 3">
             <a:extLst>
               <a:ext uri="{FF2B5EF4-FFF2-40B4-BE49-F238E27FC236}">
-                <a16:creationId xmlns:a16="http://schemas.microsoft.com/office/drawing/2014/main" id="{C642147F-9934-4613-B8FD-60859FC5F452}"/>
+                <a16:creationId xmlns:a16="http://schemas.microsoft.com/office/drawing/2014/main" xmlns="" id="{C642147F-9934-4613-B8FD-60859FC5F452}"/>
               </a:ext>
             </a:extLst>
           </p:cNvPr>
@@ -4905,7 +4900,7 @@
           <p:cNvPr id="5" name="Date Placeholder 4">
             <a:extLst>
               <a:ext uri="{FF2B5EF4-FFF2-40B4-BE49-F238E27FC236}">
-                <a16:creationId xmlns:a16="http://schemas.microsoft.com/office/drawing/2014/main" id="{110D8999-2373-432C-A3F1-9DD328941D40}"/>
+                <a16:creationId xmlns:a16="http://schemas.microsoft.com/office/drawing/2014/main" xmlns="" id="{110D8999-2373-432C-A3F1-9DD328941D40}"/>
               </a:ext>
             </a:extLst>
           </p:cNvPr>
@@ -4934,7 +4929,7 @@
           <p:cNvPr id="6" name="Footer Placeholder 5">
             <a:extLst>
               <a:ext uri="{FF2B5EF4-FFF2-40B4-BE49-F238E27FC236}">
-                <a16:creationId xmlns:a16="http://schemas.microsoft.com/office/drawing/2014/main" id="{3B0C47CF-EFEC-4439-BAAF-E5E5F16BC9E1}"/>
+                <a16:creationId xmlns:a16="http://schemas.microsoft.com/office/drawing/2014/main" xmlns="" id="{3B0C47CF-EFEC-4439-BAAF-E5E5F16BC9E1}"/>
               </a:ext>
             </a:extLst>
           </p:cNvPr>
@@ -4959,7 +4954,7 @@
           <p:cNvPr id="7" name="Slide Number Placeholder 6">
             <a:extLst>
               <a:ext uri="{FF2B5EF4-FFF2-40B4-BE49-F238E27FC236}">
-                <a16:creationId xmlns:a16="http://schemas.microsoft.com/office/drawing/2014/main" id="{94CD92CB-45E7-4B48-BBBC-02927AA80F7F}"/>
+                <a16:creationId xmlns:a16="http://schemas.microsoft.com/office/drawing/2014/main" xmlns="" id="{94CD92CB-45E7-4B48-BBBC-02927AA80F7F}"/>
               </a:ext>
             </a:extLst>
           </p:cNvPr>
@@ -5019,7 +5014,7 @@
           <p:cNvPr id="2" name="Title 1">
             <a:extLst>
               <a:ext uri="{FF2B5EF4-FFF2-40B4-BE49-F238E27FC236}">
-                <a16:creationId xmlns:a16="http://schemas.microsoft.com/office/drawing/2014/main" id="{26915001-53DE-4A30-998C-24CBE25E97BF}"/>
+                <a16:creationId xmlns:a16="http://schemas.microsoft.com/office/drawing/2014/main" xmlns="" id="{26915001-53DE-4A30-998C-24CBE25E97BF}"/>
               </a:ext>
             </a:extLst>
           </p:cNvPr>
@@ -5056,7 +5051,7 @@
           <p:cNvPr id="3" name="Picture Placeholder 2">
             <a:extLst>
               <a:ext uri="{FF2B5EF4-FFF2-40B4-BE49-F238E27FC236}">
-                <a16:creationId xmlns:a16="http://schemas.microsoft.com/office/drawing/2014/main" id="{172169E9-E64D-48A6-AA98-7101F22F3980}"/>
+                <a16:creationId xmlns:a16="http://schemas.microsoft.com/office/drawing/2014/main" xmlns="" id="{172169E9-E64D-48A6-AA98-7101F22F3980}"/>
               </a:ext>
             </a:extLst>
           </p:cNvPr>
@@ -5123,7 +5118,7 @@
           <p:cNvPr id="4" name="Text Placeholder 3">
             <a:extLst>
               <a:ext uri="{FF2B5EF4-FFF2-40B4-BE49-F238E27FC236}">
-                <a16:creationId xmlns:a16="http://schemas.microsoft.com/office/drawing/2014/main" id="{7FD77A60-F242-4108-9478-EB9DF7BA2910}"/>
+                <a16:creationId xmlns:a16="http://schemas.microsoft.com/office/drawing/2014/main" xmlns="" id="{7FD77A60-F242-4108-9478-EB9DF7BA2910}"/>
               </a:ext>
             </a:extLst>
           </p:cNvPr>
@@ -5194,7 +5189,7 @@
           <p:cNvPr id="5" name="Date Placeholder 4">
             <a:extLst>
               <a:ext uri="{FF2B5EF4-FFF2-40B4-BE49-F238E27FC236}">
-                <a16:creationId xmlns:a16="http://schemas.microsoft.com/office/drawing/2014/main" id="{625B6853-EBC4-4762-9AA2-AE81A41E507F}"/>
+                <a16:creationId xmlns:a16="http://schemas.microsoft.com/office/drawing/2014/main" xmlns="" id="{625B6853-EBC4-4762-9AA2-AE81A41E507F}"/>
               </a:ext>
             </a:extLst>
           </p:cNvPr>
@@ -5223,7 +5218,7 @@
           <p:cNvPr id="6" name="Footer Placeholder 5">
             <a:extLst>
               <a:ext uri="{FF2B5EF4-FFF2-40B4-BE49-F238E27FC236}">
-                <a16:creationId xmlns:a16="http://schemas.microsoft.com/office/drawing/2014/main" id="{E2A2A058-73DA-4FDD-AC4A-4915D297ABFA}"/>
+                <a16:creationId xmlns:a16="http://schemas.microsoft.com/office/drawing/2014/main" xmlns="" id="{E2A2A058-73DA-4FDD-AC4A-4915D297ABFA}"/>
               </a:ext>
             </a:extLst>
           </p:cNvPr>
@@ -5248,7 +5243,7 @@
           <p:cNvPr id="7" name="Slide Number Placeholder 6">
             <a:extLst>
               <a:ext uri="{FF2B5EF4-FFF2-40B4-BE49-F238E27FC236}">
-                <a16:creationId xmlns:a16="http://schemas.microsoft.com/office/drawing/2014/main" id="{D3B7569D-CD12-4DBC-9165-688CD7CD8A00}"/>
+                <a16:creationId xmlns:a16="http://schemas.microsoft.com/office/drawing/2014/main" xmlns="" id="{D3B7569D-CD12-4DBC-9165-688CD7CD8A00}"/>
               </a:ext>
             </a:extLst>
           </p:cNvPr>
@@ -5446,7 +5441,7 @@
           <p:cNvPr id="2" name="Title 1">
             <a:extLst>
               <a:ext uri="{FF2B5EF4-FFF2-40B4-BE49-F238E27FC236}">
-                <a16:creationId xmlns:a16="http://schemas.microsoft.com/office/drawing/2014/main" id="{3D2A5C66-BD54-4A52-AF54-2608618BF659}"/>
+                <a16:creationId xmlns:a16="http://schemas.microsoft.com/office/drawing/2014/main" xmlns="" id="{3D2A5C66-BD54-4A52-AF54-2608618BF659}"/>
               </a:ext>
             </a:extLst>
           </p:cNvPr>
@@ -5474,7 +5469,7 @@
           <p:cNvPr id="3" name="Vertical Text Placeholder 2">
             <a:extLst>
               <a:ext uri="{FF2B5EF4-FFF2-40B4-BE49-F238E27FC236}">
-                <a16:creationId xmlns:a16="http://schemas.microsoft.com/office/drawing/2014/main" id="{0E69D13B-2CE3-439F-8A73-2189BC181B17}"/>
+                <a16:creationId xmlns:a16="http://schemas.microsoft.com/office/drawing/2014/main" xmlns="" id="{0E69D13B-2CE3-439F-8A73-2189BC181B17}"/>
               </a:ext>
             </a:extLst>
           </p:cNvPr>
@@ -5531,7 +5526,7 @@
           <p:cNvPr id="4" name="Date Placeholder 3">
             <a:extLst>
               <a:ext uri="{FF2B5EF4-FFF2-40B4-BE49-F238E27FC236}">
-                <a16:creationId xmlns:a16="http://schemas.microsoft.com/office/drawing/2014/main" id="{3DB0E91A-0699-4658-99EF-C95E38F1A62D}"/>
+                <a16:creationId xmlns:a16="http://schemas.microsoft.com/office/drawing/2014/main" xmlns="" id="{3DB0E91A-0699-4658-99EF-C95E38F1A62D}"/>
               </a:ext>
             </a:extLst>
           </p:cNvPr>
@@ -5560,7 +5555,7 @@
           <p:cNvPr id="5" name="Footer Placeholder 4">
             <a:extLst>
               <a:ext uri="{FF2B5EF4-FFF2-40B4-BE49-F238E27FC236}">
-                <a16:creationId xmlns:a16="http://schemas.microsoft.com/office/drawing/2014/main" id="{9498F090-EE59-46FD-B1FE-AB64D31AEFF1}"/>
+                <a16:creationId xmlns:a16="http://schemas.microsoft.com/office/drawing/2014/main" xmlns="" id="{9498F090-EE59-46FD-B1FE-AB64D31AEFF1}"/>
               </a:ext>
             </a:extLst>
           </p:cNvPr>
@@ -5585,7 +5580,7 @@
           <p:cNvPr id="6" name="Slide Number Placeholder 5">
             <a:extLst>
               <a:ext uri="{FF2B5EF4-FFF2-40B4-BE49-F238E27FC236}">
-                <a16:creationId xmlns:a16="http://schemas.microsoft.com/office/drawing/2014/main" id="{21EC4754-AD1B-4E50-BF97-709F2F9726A6}"/>
+                <a16:creationId xmlns:a16="http://schemas.microsoft.com/office/drawing/2014/main" xmlns="" id="{21EC4754-AD1B-4E50-BF97-709F2F9726A6}"/>
               </a:ext>
             </a:extLst>
           </p:cNvPr>
@@ -5645,7 +5640,7 @@
           <p:cNvPr id="2" name="Vertical Title 1">
             <a:extLst>
               <a:ext uri="{FF2B5EF4-FFF2-40B4-BE49-F238E27FC236}">
-                <a16:creationId xmlns:a16="http://schemas.microsoft.com/office/drawing/2014/main" id="{325E064C-BB38-4CB8-B44D-6D8A27B86DFA}"/>
+                <a16:creationId xmlns:a16="http://schemas.microsoft.com/office/drawing/2014/main" xmlns="" id="{325E064C-BB38-4CB8-B44D-6D8A27B86DFA}"/>
               </a:ext>
             </a:extLst>
           </p:cNvPr>
@@ -5678,7 +5673,7 @@
           <p:cNvPr id="3" name="Vertical Text Placeholder 2">
             <a:extLst>
               <a:ext uri="{FF2B5EF4-FFF2-40B4-BE49-F238E27FC236}">
-                <a16:creationId xmlns:a16="http://schemas.microsoft.com/office/drawing/2014/main" id="{498DCB24-0599-415D-92BA-60F26AC5C9E9}"/>
+                <a16:creationId xmlns:a16="http://schemas.microsoft.com/office/drawing/2014/main" xmlns="" id="{498DCB24-0599-415D-92BA-60F26AC5C9E9}"/>
               </a:ext>
             </a:extLst>
           </p:cNvPr>
@@ -5740,7 +5735,7 @@
           <p:cNvPr id="4" name="Date Placeholder 3">
             <a:extLst>
               <a:ext uri="{FF2B5EF4-FFF2-40B4-BE49-F238E27FC236}">
-                <a16:creationId xmlns:a16="http://schemas.microsoft.com/office/drawing/2014/main" id="{02236383-1701-4F8A-9085-1738E079AA0F}"/>
+                <a16:creationId xmlns:a16="http://schemas.microsoft.com/office/drawing/2014/main" xmlns="" id="{02236383-1701-4F8A-9085-1738E079AA0F}"/>
               </a:ext>
             </a:extLst>
           </p:cNvPr>
@@ -5769,7 +5764,7 @@
           <p:cNvPr id="5" name="Footer Placeholder 4">
             <a:extLst>
               <a:ext uri="{FF2B5EF4-FFF2-40B4-BE49-F238E27FC236}">
-                <a16:creationId xmlns:a16="http://schemas.microsoft.com/office/drawing/2014/main" id="{3A440648-90BE-4647-8C47-20DB553BC392}"/>
+                <a16:creationId xmlns:a16="http://schemas.microsoft.com/office/drawing/2014/main" xmlns="" id="{3A440648-90BE-4647-8C47-20DB553BC392}"/>
               </a:ext>
             </a:extLst>
           </p:cNvPr>
@@ -5794,7 +5789,7 @@
           <p:cNvPr id="6" name="Slide Number Placeholder 5">
             <a:extLst>
               <a:ext uri="{FF2B5EF4-FFF2-40B4-BE49-F238E27FC236}">
-                <a16:creationId xmlns:a16="http://schemas.microsoft.com/office/drawing/2014/main" id="{977B9881-7621-4848-8B79-4DACBFACC92F}"/>
+                <a16:creationId xmlns:a16="http://schemas.microsoft.com/office/drawing/2014/main" xmlns="" id="{977B9881-7621-4848-8B79-4DACBFACC92F}"/>
               </a:ext>
             </a:extLst>
           </p:cNvPr>
@@ -7515,7 +7510,7 @@
           <p:cNvPr id="2" name="Title Placeholder 1">
             <a:extLst>
               <a:ext uri="{FF2B5EF4-FFF2-40B4-BE49-F238E27FC236}">
-                <a16:creationId xmlns:a16="http://schemas.microsoft.com/office/drawing/2014/main" id="{0D542255-984A-411B-8206-B6A43FF677D3}"/>
+                <a16:creationId xmlns:a16="http://schemas.microsoft.com/office/drawing/2014/main" xmlns="" id="{0D542255-984A-411B-8206-B6A43FF677D3}"/>
               </a:ext>
             </a:extLst>
           </p:cNvPr>
@@ -7553,7 +7548,7 @@
           <p:cNvPr id="3" name="Text Placeholder 2">
             <a:extLst>
               <a:ext uri="{FF2B5EF4-FFF2-40B4-BE49-F238E27FC236}">
-                <a16:creationId xmlns:a16="http://schemas.microsoft.com/office/drawing/2014/main" id="{016234EA-EB5E-4A6A-90BD-9C1FE1FD8D0C}"/>
+                <a16:creationId xmlns:a16="http://schemas.microsoft.com/office/drawing/2014/main" xmlns="" id="{016234EA-EB5E-4A6A-90BD-9C1FE1FD8D0C}"/>
               </a:ext>
             </a:extLst>
           </p:cNvPr>
@@ -7620,7 +7615,7 @@
           <p:cNvPr id="4" name="Date Placeholder 3">
             <a:extLst>
               <a:ext uri="{FF2B5EF4-FFF2-40B4-BE49-F238E27FC236}">
-                <a16:creationId xmlns:a16="http://schemas.microsoft.com/office/drawing/2014/main" id="{9B966B8B-C053-4C75-9465-DD9D0ADE44FD}"/>
+                <a16:creationId xmlns:a16="http://schemas.microsoft.com/office/drawing/2014/main" xmlns="" id="{9B966B8B-C053-4C75-9465-DD9D0ADE44FD}"/>
               </a:ext>
             </a:extLst>
           </p:cNvPr>
@@ -7667,7 +7662,7 @@
           <p:cNvPr id="5" name="Footer Placeholder 4">
             <a:extLst>
               <a:ext uri="{FF2B5EF4-FFF2-40B4-BE49-F238E27FC236}">
-                <a16:creationId xmlns:a16="http://schemas.microsoft.com/office/drawing/2014/main" id="{FB5E2A8D-E1E3-4EC8-A675-F4B69202AA4B}"/>
+                <a16:creationId xmlns:a16="http://schemas.microsoft.com/office/drawing/2014/main" xmlns="" id="{FB5E2A8D-E1E3-4EC8-A675-F4B69202AA4B}"/>
               </a:ext>
             </a:extLst>
           </p:cNvPr>
@@ -7710,7 +7705,7 @@
           <p:cNvPr id="6" name="Slide Number Placeholder 5">
             <a:extLst>
               <a:ext uri="{FF2B5EF4-FFF2-40B4-BE49-F238E27FC236}">
-                <a16:creationId xmlns:a16="http://schemas.microsoft.com/office/drawing/2014/main" id="{91F26CB0-E05A-4E9B-BDDD-2DDD382CE575}"/>
+                <a16:creationId xmlns:a16="http://schemas.microsoft.com/office/drawing/2014/main" xmlns="" id="{91F26CB0-E05A-4E9B-BDDD-2DDD382CE575}"/>
               </a:ext>
             </a:extLst>
           </p:cNvPr>
@@ -7757,7 +7752,7 @@
           <p:cNvPr id="7" name="Rectangle 6">
             <a:extLst>
               <a:ext uri="{FF2B5EF4-FFF2-40B4-BE49-F238E27FC236}">
-                <a16:creationId xmlns:a16="http://schemas.microsoft.com/office/drawing/2014/main" id="{BE0AD535-A34F-4B45-A2C9-B967B1057F6C}"/>
+                <a16:creationId xmlns:a16="http://schemas.microsoft.com/office/drawing/2014/main" xmlns="" id="{BE0AD535-A34F-4B45-A2C9-B967B1057F6C}"/>
               </a:ext>
             </a:extLst>
           </p:cNvPr>
@@ -7811,7 +7806,7 @@
           <p:cNvPr id="8" name="Rectangle 7">
             <a:extLst>
               <a:ext uri="{FF2B5EF4-FFF2-40B4-BE49-F238E27FC236}">
-                <a16:creationId xmlns:a16="http://schemas.microsoft.com/office/drawing/2014/main" id="{CFCA9BB1-D63A-4E13-9B3D-57C9E8B4D423}"/>
+                <a16:creationId xmlns:a16="http://schemas.microsoft.com/office/drawing/2014/main" xmlns="" id="{CFCA9BB1-D63A-4E13-9B3D-57C9E8B4D423}"/>
               </a:ext>
             </a:extLst>
           </p:cNvPr>
@@ -8187,7 +8182,7 @@
           <p:cNvPr id="2" name="Title 1">
             <a:extLst>
               <a:ext uri="{FF2B5EF4-FFF2-40B4-BE49-F238E27FC236}">
-                <a16:creationId xmlns:a16="http://schemas.microsoft.com/office/drawing/2014/main" id="{415649E1-0182-6342-BE54-103E4D478F60}"/>
+                <a16:creationId xmlns:a16="http://schemas.microsoft.com/office/drawing/2014/main" xmlns="" id="{415649E1-0182-6342-BE54-103E4D478F60}"/>
               </a:ext>
             </a:extLst>
           </p:cNvPr>
@@ -8288,7 +8283,7 @@
           <p:cNvPr id="2" name="Title 1">
             <a:extLst>
               <a:ext uri="{FF2B5EF4-FFF2-40B4-BE49-F238E27FC236}">
-                <a16:creationId xmlns:a16="http://schemas.microsoft.com/office/drawing/2014/main" id="{FDEBE078-1C38-49CE-8E97-43A8D563A5D8}"/>
+                <a16:creationId xmlns:a16="http://schemas.microsoft.com/office/drawing/2014/main" xmlns="" id="{FDEBE078-1C38-49CE-8E97-43A8D563A5D8}"/>
               </a:ext>
             </a:extLst>
           </p:cNvPr>
@@ -8316,7 +8311,7 @@
           <p:cNvPr id="24" name="Content Placeholder 23">
             <a:extLst>
               <a:ext uri="{FF2B5EF4-FFF2-40B4-BE49-F238E27FC236}">
-                <a16:creationId xmlns:a16="http://schemas.microsoft.com/office/drawing/2014/main" id="{04476466-D3B3-4652-9ED3-2F6B3E113B7E}"/>
+                <a16:creationId xmlns:a16="http://schemas.microsoft.com/office/drawing/2014/main" xmlns="" id="{04476466-D3B3-4652-9ED3-2F6B3E113B7E}"/>
               </a:ext>
             </a:extLst>
           </p:cNvPr>
@@ -8360,7 +8355,7 @@
           <p:cNvPr id="25" name="Content Placeholder 4">
             <a:extLst>
               <a:ext uri="{FF2B5EF4-FFF2-40B4-BE49-F238E27FC236}">
-                <a16:creationId xmlns:a16="http://schemas.microsoft.com/office/drawing/2014/main" id="{F75CF71A-6B34-4679-AD9E-4876F2A64D87}"/>
+                <a16:creationId xmlns:a16="http://schemas.microsoft.com/office/drawing/2014/main" xmlns="" id="{F75CF71A-6B34-4679-AD9E-4876F2A64D87}"/>
               </a:ext>
             </a:extLst>
           </p:cNvPr>
@@ -8390,7 +8385,7 @@
           <p:cNvPr id="26" name="Content Placeholder 19" descr="A picture containing table, bird&#10;&#10;Description automatically generated">
             <a:extLst>
               <a:ext uri="{FF2B5EF4-FFF2-40B4-BE49-F238E27FC236}">
-                <a16:creationId xmlns:a16="http://schemas.microsoft.com/office/drawing/2014/main" id="{3FD9897A-2BC4-4F91-ABCB-4ED24A4643E0}"/>
+                <a16:creationId xmlns:a16="http://schemas.microsoft.com/office/drawing/2014/main" xmlns="" id="{3FD9897A-2BC4-4F91-ABCB-4ED24A4643E0}"/>
               </a:ext>
             </a:extLst>
           </p:cNvPr>
@@ -8420,7 +8415,7 @@
           <p:cNvPr id="27" name="TextBox 26">
             <a:extLst>
               <a:ext uri="{FF2B5EF4-FFF2-40B4-BE49-F238E27FC236}">
-                <a16:creationId xmlns:a16="http://schemas.microsoft.com/office/drawing/2014/main" id="{7E39D82B-7C13-415E-BFC5-AED29E5D07DD}"/>
+                <a16:creationId xmlns:a16="http://schemas.microsoft.com/office/drawing/2014/main" xmlns="" id="{7E39D82B-7C13-415E-BFC5-AED29E5D07DD}"/>
               </a:ext>
             </a:extLst>
           </p:cNvPr>
@@ -8491,7 +8486,7 @@
           <p:cNvPr id="2" name="Title 1">
             <a:extLst>
               <a:ext uri="{FF2B5EF4-FFF2-40B4-BE49-F238E27FC236}">
-                <a16:creationId xmlns:a16="http://schemas.microsoft.com/office/drawing/2014/main" id="{7AE7E75F-E5D0-4D7E-A151-0938E8483110}"/>
+                <a16:creationId xmlns:a16="http://schemas.microsoft.com/office/drawing/2014/main" xmlns="" id="{7AE7E75F-E5D0-4D7E-A151-0938E8483110}"/>
               </a:ext>
             </a:extLst>
           </p:cNvPr>
@@ -8519,7 +8514,7 @@
           <p:cNvPr id="4" name="Content Placeholder 3">
             <a:extLst>
               <a:ext uri="{FF2B5EF4-FFF2-40B4-BE49-F238E27FC236}">
-                <a16:creationId xmlns:a16="http://schemas.microsoft.com/office/drawing/2014/main" id="{C524D586-9BA9-4A57-B217-9DE56CA9FACB}"/>
+                <a16:creationId xmlns:a16="http://schemas.microsoft.com/office/drawing/2014/main" xmlns="" id="{C524D586-9BA9-4A57-B217-9DE56CA9FACB}"/>
               </a:ext>
             </a:extLst>
           </p:cNvPr>
@@ -8563,7 +8558,7 @@
           <p:cNvPr id="8" name="Content Placeholder 4">
             <a:extLst>
               <a:ext uri="{FF2B5EF4-FFF2-40B4-BE49-F238E27FC236}">
-                <a16:creationId xmlns:a16="http://schemas.microsoft.com/office/drawing/2014/main" id="{29B27657-3457-4BAC-A548-F63216B62298}"/>
+                <a16:creationId xmlns:a16="http://schemas.microsoft.com/office/drawing/2014/main" xmlns="" id="{29B27657-3457-4BAC-A548-F63216B62298}"/>
               </a:ext>
             </a:extLst>
           </p:cNvPr>
@@ -8595,7 +8590,7 @@
           <p:cNvPr id="9" name="TextBox 8">
             <a:extLst>
               <a:ext uri="{FF2B5EF4-FFF2-40B4-BE49-F238E27FC236}">
-                <a16:creationId xmlns:a16="http://schemas.microsoft.com/office/drawing/2014/main" id="{8AD713BD-B152-4CE4-8AC3-2BD741AB17AC}"/>
+                <a16:creationId xmlns:a16="http://schemas.microsoft.com/office/drawing/2014/main" xmlns="" id="{8AD713BD-B152-4CE4-8AC3-2BD741AB17AC}"/>
               </a:ext>
             </a:extLst>
           </p:cNvPr>
@@ -8638,7 +8633,7 @@
               <p:cNvPr id="10" name="Rectangle 9">
                 <a:extLst>
                   <a:ext uri="{FF2B5EF4-FFF2-40B4-BE49-F238E27FC236}">
-                    <a16:creationId xmlns:a16="http://schemas.microsoft.com/office/drawing/2014/main" id="{F6FF6F98-D5ED-4298-A490-03FBEB6CF1BC}"/>
+                    <a16:creationId xmlns:a16="http://schemas.microsoft.com/office/drawing/2014/main" xmlns="" id="{F6FF6F98-D5ED-4298-A490-03FBEB6CF1BC}"/>
                   </a:ext>
                 </a:extLst>
               </p:cNvPr>
@@ -9055,7 +9050,7 @@
           <p:cNvPr id="11" name="Rectangle 10">
             <a:extLst>
               <a:ext uri="{FF2B5EF4-FFF2-40B4-BE49-F238E27FC236}">
-                <a16:creationId xmlns:a16="http://schemas.microsoft.com/office/drawing/2014/main" id="{44FC85B3-FD68-4E12-99DB-F0E1101D6599}"/>
+                <a16:creationId xmlns:a16="http://schemas.microsoft.com/office/drawing/2014/main" xmlns="" id="{44FC85B3-FD68-4E12-99DB-F0E1101D6599}"/>
               </a:ext>
             </a:extLst>
           </p:cNvPr>
@@ -9090,7 +9085,7 @@
           <p:cNvPr id="12" name="Rectangle 11">
             <a:extLst>
               <a:ext uri="{FF2B5EF4-FFF2-40B4-BE49-F238E27FC236}">
-                <a16:creationId xmlns:a16="http://schemas.microsoft.com/office/drawing/2014/main" id="{A2DE9F2D-08F2-4AE4-AF7E-CA9C1AEE02CF}"/>
+                <a16:creationId xmlns:a16="http://schemas.microsoft.com/office/drawing/2014/main" xmlns="" id="{A2DE9F2D-08F2-4AE4-AF7E-CA9C1AEE02CF}"/>
               </a:ext>
             </a:extLst>
           </p:cNvPr>
@@ -9154,7 +9149,7 @@
           <p:cNvPr id="2" name="Title 1">
             <a:extLst>
               <a:ext uri="{FF2B5EF4-FFF2-40B4-BE49-F238E27FC236}">
-                <a16:creationId xmlns:a16="http://schemas.microsoft.com/office/drawing/2014/main" id="{35AF407F-225A-4172-B3D9-88A68FDB32F8}"/>
+                <a16:creationId xmlns:a16="http://schemas.microsoft.com/office/drawing/2014/main" xmlns="" id="{35AF407F-225A-4172-B3D9-88A68FDB32F8}"/>
               </a:ext>
             </a:extLst>
           </p:cNvPr>
@@ -9182,7 +9177,7 @@
           <p:cNvPr id="4" name="Table 5">
             <a:extLst>
               <a:ext uri="{FF2B5EF4-FFF2-40B4-BE49-F238E27FC236}">
-                <a16:creationId xmlns:a16="http://schemas.microsoft.com/office/drawing/2014/main" id="{3A315912-E693-4369-A3C8-9B67BF129049}"/>
+                <a16:creationId xmlns:a16="http://schemas.microsoft.com/office/drawing/2014/main" xmlns="" id="{3A315912-E693-4369-A3C8-9B67BF129049}"/>
               </a:ext>
             </a:extLst>
           </p:cNvPr>
@@ -9193,14 +9188,14 @@
             <p:ph idx="1"/>
             <p:extLst>
               <p:ext uri="{D42A27DB-BD31-4B8C-83A1-F6EECF244321}">
-                <p14:modId xmlns:p14="http://schemas.microsoft.com/office/powerpoint/2010/main" val="2226373809"/>
+                <p14:modId xmlns:p14="http://schemas.microsoft.com/office/powerpoint/2010/main" val="2608959252"/>
               </p:ext>
             </p:extLst>
           </p:nvPr>
         </p:nvGraphicFramePr>
         <p:xfrm>
           <a:off x="2212108" y="2399886"/>
-          <a:ext cx="4729193" cy="2694940"/>
+          <a:ext cx="4729193" cy="2611120"/>
         </p:xfrm>
         <a:graphic>
           <a:graphicData uri="http://schemas.openxmlformats.org/drawingml/2006/table">
@@ -9212,28 +9207,28 @@
                 <a:gridCol w="1189355">
                   <a:extLst>
                     <a:ext uri="{9D8B030D-6E8A-4147-A177-3AD203B41FA5}">
-                      <a16:colId xmlns:a16="http://schemas.microsoft.com/office/drawing/2014/main" val="3685785100"/>
+                      <a16:colId xmlns:a16="http://schemas.microsoft.com/office/drawing/2014/main" xmlns="" val="3685785100"/>
                     </a:ext>
                   </a:extLst>
                 </a:gridCol>
                 <a:gridCol w="1179946">
                   <a:extLst>
                     <a:ext uri="{9D8B030D-6E8A-4147-A177-3AD203B41FA5}">
-                      <a16:colId xmlns:a16="http://schemas.microsoft.com/office/drawing/2014/main" val="3097926865"/>
+                      <a16:colId xmlns:a16="http://schemas.microsoft.com/office/drawing/2014/main" xmlns="" val="3097926865"/>
                     </a:ext>
                   </a:extLst>
                 </a:gridCol>
                 <a:gridCol w="1179946">
                   <a:extLst>
                     <a:ext uri="{9D8B030D-6E8A-4147-A177-3AD203B41FA5}">
-                      <a16:colId xmlns:a16="http://schemas.microsoft.com/office/drawing/2014/main" val="167857884"/>
+                      <a16:colId xmlns:a16="http://schemas.microsoft.com/office/drawing/2014/main" xmlns="" val="167857884"/>
                     </a:ext>
                   </a:extLst>
                 </a:gridCol>
                 <a:gridCol w="1179946">
                   <a:extLst>
                     <a:ext uri="{9D8B030D-6E8A-4147-A177-3AD203B41FA5}">
-                      <a16:colId xmlns:a16="http://schemas.microsoft.com/office/drawing/2014/main" val="3538674640"/>
+                      <a16:colId xmlns:a16="http://schemas.microsoft.com/office/drawing/2014/main" xmlns="" val="3538674640"/>
                     </a:ext>
                   </a:extLst>
                 </a:gridCol>
@@ -9436,7 +9431,7 @@
                 </a:tc>
                 <a:extLst>
                   <a:ext uri="{0D108BD9-81ED-4DB2-BD59-A6C34878D82A}">
-                    <a16:rowId xmlns:a16="http://schemas.microsoft.com/office/drawing/2014/main" val="3869851288"/>
+                    <a16:rowId xmlns:a16="http://schemas.microsoft.com/office/drawing/2014/main" xmlns="" val="3869851288"/>
                   </a:ext>
                 </a:extLst>
               </a:tr>
@@ -9446,14 +9441,20 @@
                     <a:bodyPr/>
                     <a:lstStyle/>
                     <a:p>
-                      <a:pPr algn="ctr"/>
+                      <a:pPr algn="ctr" rtl="0" fontAlgn="ctr"/>
                       <a:r>
-                        <a:rPr lang="en-US" dirty="0"/>
+                        <a:rPr lang="en-US" sz="1350" b="0" i="0" u="none" strike="noStrike">
+                          <a:solidFill>
+                            <a:srgbClr val="000000"/>
+                          </a:solidFill>
+                          <a:effectLst/>
+                          <a:latin typeface="Calibri" panose="020F0502020204030204" pitchFamily="34" charset="0"/>
+                        </a:rPr>
                         <a:t>Ensemble</a:t>
                       </a:r>
                     </a:p>
                   </a:txBody>
-                  <a:tcPr>
+                  <a:tcPr marL="7620" marR="7620" marT="7620" marB="0" anchor="ctr">
                     <a:lnR w="3175" cap="flat" cmpd="sng" algn="ctr">
                       <a:solidFill>
                         <a:schemeClr val="tx1"/>
@@ -9480,30 +9481,20 @@
                     <a:bodyPr/>
                     <a:lstStyle/>
                     <a:p>
-                      <a:pPr marL="0" marR="0" lvl="0" indent="0" algn="ctr" defTabSz="685800" rtl="0" eaLnBrk="1" fontAlgn="auto" latinLnBrk="0" hangingPunct="1">
-                        <a:lnSpc>
-                          <a:spcPct val="100000"/>
-                        </a:lnSpc>
-                        <a:spcBef>
-                          <a:spcPts val="0"/>
-                        </a:spcBef>
-                        <a:spcAft>
-                          <a:spcPts val="0"/>
-                        </a:spcAft>
-                        <a:buClrTx/>
-                        <a:buSzTx/>
-                        <a:buFontTx/>
-                        <a:buNone/>
-                        <a:tabLst/>
-                        <a:defRPr/>
-                      </a:pPr>
+                      <a:pPr algn="ctr" rtl="0" fontAlgn="ctr"/>
                       <a:r>
-                        <a:rPr lang="en-US" dirty="0"/>
+                        <a:rPr lang="en-US" sz="1350" b="0" i="0" u="none" strike="noStrike">
+                          <a:solidFill>
+                            <a:srgbClr val="000000"/>
+                          </a:solidFill>
+                          <a:effectLst/>
+                          <a:latin typeface="Calibri" panose="020F0502020204030204" pitchFamily="34" charset="0"/>
+                        </a:rPr>
                         <a:t>N/A</a:t>
                       </a:r>
                     </a:p>
                   </a:txBody>
-                  <a:tcPr>
+                  <a:tcPr marL="7620" marR="7620" marT="7620" marB="0" anchor="ctr">
                     <a:lnL w="3175" cap="flat" cmpd="sng" algn="ctr">
                       <a:solidFill>
                         <a:schemeClr val="tx1"/>
@@ -9539,14 +9530,20 @@
                     <a:bodyPr/>
                     <a:lstStyle/>
                     <a:p>
-                      <a:pPr algn="ctr"/>
+                      <a:pPr algn="ctr" rtl="0" fontAlgn="ctr"/>
                       <a:r>
-                        <a:rPr lang="en-US" dirty="0"/>
-                        <a:t>0.04</a:t>
+                        <a:rPr lang="en-US" sz="1350" b="0" i="0" u="none" strike="noStrike">
+                          <a:solidFill>
+                            <a:srgbClr val="000000"/>
+                          </a:solidFill>
+                          <a:effectLst/>
+                          <a:latin typeface="Calibri" panose="020F0502020204030204" pitchFamily="34" charset="0"/>
+                        </a:rPr>
+                        <a:t>0.07</a:t>
                       </a:r>
                     </a:p>
                   </a:txBody>
-                  <a:tcPr>
+                  <a:tcPr marL="7620" marR="7620" marT="7620" marB="0" anchor="ctr">
                     <a:lnL w="3175" cap="flat" cmpd="sng" algn="ctr">
                       <a:solidFill>
                         <a:schemeClr val="tx1"/>
@@ -9582,14 +9579,20 @@
                     <a:bodyPr/>
                     <a:lstStyle/>
                     <a:p>
-                      <a:pPr algn="ctr"/>
+                      <a:pPr algn="ctr" rtl="0" fontAlgn="ctr"/>
                       <a:r>
-                        <a:rPr lang="en-US" dirty="0"/>
-                        <a:t>0.070</a:t>
+                        <a:rPr lang="en-US" sz="1350" b="0" i="0" u="none" strike="noStrike">
+                          <a:solidFill>
+                            <a:srgbClr val="000000"/>
+                          </a:solidFill>
+                          <a:effectLst/>
+                          <a:latin typeface="Calibri" panose="020F0502020204030204" pitchFamily="34" charset="0"/>
+                        </a:rPr>
+                        <a:t>0.138</a:t>
                       </a:r>
                     </a:p>
                   </a:txBody>
-                  <a:tcPr>
+                  <a:tcPr marL="7620" marR="7620" marT="7620" marB="0" anchor="ctr">
                     <a:lnL w="3175" cap="flat" cmpd="sng" algn="ctr">
                       <a:solidFill>
                         <a:schemeClr val="tx1"/>
@@ -9622,7 +9625,7 @@
                 </a:tc>
                 <a:extLst>
                   <a:ext uri="{0D108BD9-81ED-4DB2-BD59-A6C34878D82A}">
-                    <a16:rowId xmlns:a16="http://schemas.microsoft.com/office/drawing/2014/main" val="3200255482"/>
+                    <a16:rowId xmlns:a16="http://schemas.microsoft.com/office/drawing/2014/main" xmlns="" val="3200255482"/>
                   </a:ext>
                 </a:extLst>
               </a:tr>
@@ -9632,21 +9635,20 @@
                     <a:bodyPr/>
                     <a:lstStyle/>
                     <a:p>
-                      <a:pPr algn="ctr"/>
+                      <a:pPr algn="ctr" rtl="0" fontAlgn="ctr"/>
                       <a:r>
-                        <a:rPr lang="en-US" dirty="0"/>
-                        <a:t>Signal + Noise</a:t>
-                      </a:r>
-                    </a:p>
-                    <a:p>
-                      <a:pPr algn="ctr"/>
-                      <a:r>
-                        <a:rPr lang="en-US" dirty="0"/>
-                        <a:t>ARMA (2,1)</a:t>
+                        <a:rPr lang="en-US" sz="1350" b="0" i="0" u="none" strike="noStrike">
+                          <a:solidFill>
+                            <a:srgbClr val="000000"/>
+                          </a:solidFill>
+                          <a:effectLst/>
+                          <a:latin typeface="Calibri" panose="020F0502020204030204" pitchFamily="34" charset="0"/>
+                        </a:rPr>
+                        <a:t>NN</a:t>
                       </a:r>
                     </a:p>
                   </a:txBody>
-                  <a:tcPr>
+                  <a:tcPr marL="7620" marR="7620" marT="7620" marB="0" anchor="ctr">
                     <a:lnR w="3175" cap="flat" cmpd="sng" algn="ctr">
                       <a:solidFill>
                         <a:schemeClr val="tx1"/>
@@ -9666,14 +9668,20 @@
                     <a:bodyPr/>
                     <a:lstStyle/>
                     <a:p>
-                      <a:pPr algn="ctr"/>
+                      <a:pPr algn="ctr" rtl="0" fontAlgn="ctr"/>
                       <a:r>
-                        <a:rPr lang="en-US" dirty="0"/>
-                        <a:t>-2.079</a:t>
+                        <a:rPr lang="en-US" sz="1350" b="0" i="0" u="none" strike="noStrike">
+                          <a:solidFill>
+                            <a:srgbClr val="000000"/>
+                          </a:solidFill>
+                          <a:effectLst/>
+                          <a:latin typeface="Calibri" panose="020F0502020204030204" pitchFamily="34" charset="0"/>
+                        </a:rPr>
+                        <a:t>N/A</a:t>
                       </a:r>
                     </a:p>
                   </a:txBody>
-                  <a:tcPr>
+                  <a:tcPr marL="7620" marR="7620" marT="7620" marB="0" anchor="ctr">
                     <a:lnL w="3175" cap="flat" cmpd="sng" algn="ctr">
                       <a:solidFill>
                         <a:schemeClr val="tx1"/>
@@ -9702,14 +9710,20 @@
                     <a:bodyPr/>
                     <a:lstStyle/>
                     <a:p>
-                      <a:pPr algn="ctr"/>
+                      <a:pPr algn="ctr" rtl="0" fontAlgn="ctr"/>
                       <a:r>
-                        <a:rPr lang="en-US" dirty="0"/>
-                        <a:t>0.134</a:t>
+                        <a:rPr lang="en-US" sz="1350" b="0" i="0" u="none" strike="noStrike">
+                          <a:solidFill>
+                            <a:srgbClr val="000000"/>
+                          </a:solidFill>
+                          <a:effectLst/>
+                          <a:latin typeface="Calibri" panose="020F0502020204030204" pitchFamily="34" charset="0"/>
+                        </a:rPr>
+                        <a:t>0.063</a:t>
                       </a:r>
                     </a:p>
                   </a:txBody>
-                  <a:tcPr>
+                  <a:tcPr marL="7620" marR="7620" marT="7620" marB="0" anchor="ctr">
                     <a:lnL w="3175" cap="flat" cmpd="sng" algn="ctr">
                       <a:solidFill>
                         <a:schemeClr val="tx1"/>
@@ -9738,14 +9752,20 @@
                     <a:bodyPr/>
                     <a:lstStyle/>
                     <a:p>
-                      <a:pPr algn="ctr"/>
+                      <a:pPr algn="ctr" rtl="0" fontAlgn="ctr"/>
                       <a:r>
-                        <a:rPr lang="en-US" dirty="0"/>
-                        <a:t>0.133</a:t>
+                        <a:rPr lang="en-US" sz="1350" b="0" i="0" u="none" strike="noStrike">
+                          <a:solidFill>
+                            <a:srgbClr val="000000"/>
+                          </a:solidFill>
+                          <a:effectLst/>
+                          <a:latin typeface="Calibri" panose="020F0502020204030204" pitchFamily="34" charset="0"/>
+                        </a:rPr>
+                        <a:t>0.142</a:t>
                       </a:r>
                     </a:p>
                   </a:txBody>
-                  <a:tcPr>
+                  <a:tcPr marL="7620" marR="7620" marT="7620" marB="0" anchor="ctr">
                     <a:lnL w="3175" cap="flat" cmpd="sng" algn="ctr">
                       <a:solidFill>
                         <a:schemeClr val="tx1"/>
@@ -9771,7 +9791,7 @@
                 </a:tc>
                 <a:extLst>
                   <a:ext uri="{0D108BD9-81ED-4DB2-BD59-A6C34878D82A}">
-                    <a16:rowId xmlns:a16="http://schemas.microsoft.com/office/drawing/2014/main" val="3226780701"/>
+                    <a16:rowId xmlns:a16="http://schemas.microsoft.com/office/drawing/2014/main" xmlns="" val="3226780701"/>
                   </a:ext>
                 </a:extLst>
               </a:tr>
@@ -9781,14 +9801,39 @@
                     <a:bodyPr/>
                     <a:lstStyle/>
                     <a:p>
-                      <a:pPr algn="ctr"/>
+                      <a:pPr algn="ctr" rtl="0" fontAlgn="ctr"/>
                       <a:r>
-                        <a:rPr lang="en-US" dirty="0"/>
-                        <a:t>NN</a:t>
+                        <a:rPr lang="en-US" sz="1350" b="0" i="0" u="none" strike="noStrike" dirty="0">
+                          <a:solidFill>
+                            <a:srgbClr val="000000"/>
+                          </a:solidFill>
+                          <a:effectLst/>
+                          <a:latin typeface="Calibri" panose="020F0502020204030204" pitchFamily="34" charset="0"/>
+                        </a:rPr>
+                        <a:t>Signal + Noise</a:t>
+                      </a:r>
+                      <a:br>
+                        <a:rPr lang="en-US" sz="1350" b="0" i="0" u="none" strike="noStrike" dirty="0">
+                          <a:solidFill>
+                            <a:srgbClr val="000000"/>
+                          </a:solidFill>
+                          <a:effectLst/>
+                          <a:latin typeface="Calibri" panose="020F0502020204030204" pitchFamily="34" charset="0"/>
+                        </a:rPr>
+                      </a:br>
+                      <a:r>
+                        <a:rPr lang="en-US" sz="1350" b="0" i="0" u="none" strike="noStrike" dirty="0">
+                          <a:solidFill>
+                            <a:srgbClr val="000000"/>
+                          </a:solidFill>
+                          <a:effectLst/>
+                          <a:latin typeface="Calibri" panose="020F0502020204030204" pitchFamily="34" charset="0"/>
+                        </a:rPr>
+                        <a:t>ARMA (2,1)</a:t>
                       </a:r>
                     </a:p>
                   </a:txBody>
-                  <a:tcPr>
+                  <a:tcPr marL="7620" marR="7620" marT="7620" marB="0" anchor="ctr">
                     <a:lnR w="3175" cap="flat" cmpd="sng" algn="ctr">
                       <a:solidFill>
                         <a:schemeClr val="tx1"/>
@@ -9806,14 +9851,20 @@
                     <a:bodyPr/>
                     <a:lstStyle/>
                     <a:p>
-                      <a:pPr algn="ctr"/>
+                      <a:pPr algn="ctr" rtl="0" fontAlgn="ctr"/>
                       <a:r>
-                        <a:rPr lang="en-US" dirty="0"/>
-                        <a:t>N/A</a:t>
+                        <a:rPr lang="en-US" sz="1350" b="0" i="0" u="none" strike="noStrike" dirty="0">
+                          <a:solidFill>
+                            <a:srgbClr val="000000"/>
+                          </a:solidFill>
+                          <a:effectLst/>
+                          <a:latin typeface="Calibri" panose="020F0502020204030204" pitchFamily="34" charset="0"/>
+                        </a:rPr>
+                        <a:t>-2.079</a:t>
                       </a:r>
                     </a:p>
                   </a:txBody>
-                  <a:tcPr>
+                  <a:tcPr marL="7620" marR="7620" marT="7620" marB="0" anchor="ctr">
                     <a:lnL w="3175" cap="flat" cmpd="sng" algn="ctr">
                       <a:solidFill>
                         <a:schemeClr val="tx1"/>
@@ -9840,14 +9891,20 @@
                     <a:bodyPr/>
                     <a:lstStyle/>
                     <a:p>
-                      <a:pPr algn="ctr"/>
+                      <a:pPr algn="ctr" rtl="0" fontAlgn="ctr"/>
                       <a:r>
-                        <a:rPr lang="en-US" dirty="0"/>
-                        <a:t>0.063</a:t>
+                        <a:rPr lang="en-US" sz="1350" b="0" i="0" u="none" strike="noStrike" dirty="0">
+                          <a:solidFill>
+                            <a:srgbClr val="000000"/>
+                          </a:solidFill>
+                          <a:effectLst/>
+                          <a:latin typeface="Calibri" panose="020F0502020204030204" pitchFamily="34" charset="0"/>
+                        </a:rPr>
+                        <a:t>0.134</a:t>
                       </a:r>
                     </a:p>
                   </a:txBody>
-                  <a:tcPr>
+                  <a:tcPr marL="7620" marR="7620" marT="7620" marB="0" anchor="ctr">
                     <a:lnL w="3175" cap="flat" cmpd="sng" algn="ctr">
                       <a:solidFill>
                         <a:schemeClr val="tx1"/>
@@ -9874,14 +9931,20 @@
                     <a:bodyPr/>
                     <a:lstStyle/>
                     <a:p>
-                      <a:pPr algn="ctr"/>
+                      <a:pPr algn="ctr" rtl="0" fontAlgn="ctr"/>
                       <a:r>
-                        <a:rPr lang="en-US" dirty="0"/>
+                        <a:rPr lang="en-US" sz="1350" b="0" i="0" u="none" strike="noStrike" dirty="0">
+                          <a:solidFill>
+                            <a:srgbClr val="000000"/>
+                          </a:solidFill>
+                          <a:effectLst/>
+                          <a:latin typeface="Calibri" panose="020F0502020204030204" pitchFamily="34" charset="0"/>
+                        </a:rPr>
                         <a:t>0.133</a:t>
                       </a:r>
                     </a:p>
                   </a:txBody>
-                  <a:tcPr>
+                  <a:tcPr marL="7620" marR="7620" marT="7620" marB="0" anchor="ctr">
                     <a:lnL w="3175" cap="flat" cmpd="sng" algn="ctr">
                       <a:solidFill>
                         <a:schemeClr val="tx1"/>
@@ -9905,7 +9968,7 @@
                 </a:tc>
                 <a:extLst>
                   <a:ext uri="{0D108BD9-81ED-4DB2-BD59-A6C34878D82A}">
-                    <a16:rowId xmlns:a16="http://schemas.microsoft.com/office/drawing/2014/main" val="312971248"/>
+                    <a16:rowId xmlns:a16="http://schemas.microsoft.com/office/drawing/2014/main" xmlns="" val="312971248"/>
                   </a:ext>
                 </a:extLst>
               </a:tr>
@@ -9915,14 +9978,20 @@
                     <a:bodyPr/>
                     <a:lstStyle/>
                     <a:p>
-                      <a:pPr algn="ctr"/>
+                      <a:pPr algn="ctr" rtl="0" fontAlgn="ctr"/>
                       <a:r>
-                        <a:rPr lang="en-US" dirty="0"/>
+                        <a:rPr lang="en-US" sz="1350" b="0" i="0" u="none" strike="noStrike">
+                          <a:solidFill>
+                            <a:srgbClr val="000000"/>
+                          </a:solidFill>
+                          <a:effectLst/>
+                          <a:latin typeface="Calibri" panose="020F0502020204030204" pitchFamily="34" charset="0"/>
+                        </a:rPr>
                         <a:t>VAR</a:t>
                       </a:r>
                     </a:p>
                   </a:txBody>
-                  <a:tcPr>
+                  <a:tcPr marL="7620" marR="7620" marT="7620" marB="0" anchor="ctr">
                     <a:lnR w="3175" cap="flat" cmpd="sng" algn="ctr">
                       <a:solidFill>
                         <a:schemeClr val="tx1"/>
@@ -9942,14 +10011,20 @@
                     <a:bodyPr/>
                     <a:lstStyle/>
                     <a:p>
-                      <a:pPr algn="ctr"/>
+                      <a:pPr algn="ctr" rtl="0" fontAlgn="ctr"/>
                       <a:r>
-                        <a:rPr lang="en-US" dirty="0"/>
+                        <a:rPr lang="en-US" sz="1350" b="0" i="0" u="none" strike="noStrike">
+                          <a:solidFill>
+                            <a:srgbClr val="000000"/>
+                          </a:solidFill>
+                          <a:effectLst/>
+                          <a:latin typeface="Calibri" panose="020F0502020204030204" pitchFamily="34" charset="0"/>
+                        </a:rPr>
                         <a:t>-2.275</a:t>
                       </a:r>
                     </a:p>
                   </a:txBody>
-                  <a:tcPr>
+                  <a:tcPr marL="7620" marR="7620" marT="7620" marB="0" anchor="ctr">
                     <a:lnL w="3175" cap="flat" cmpd="sng" algn="ctr">
                       <a:solidFill>
                         <a:schemeClr val="tx1"/>
@@ -9978,14 +10053,20 @@
                     <a:bodyPr/>
                     <a:lstStyle/>
                     <a:p>
-                      <a:pPr algn="ctr"/>
+                      <a:pPr algn="ctr" rtl="0" fontAlgn="ctr"/>
                       <a:r>
-                        <a:rPr lang="en-US" dirty="0"/>
+                        <a:rPr lang="en-US" sz="1350" b="0" i="0" u="none" strike="noStrike">
+                          <a:solidFill>
+                            <a:srgbClr val="000000"/>
+                          </a:solidFill>
+                          <a:effectLst/>
+                          <a:latin typeface="Calibri" panose="020F0502020204030204" pitchFamily="34" charset="0"/>
+                        </a:rPr>
                         <a:t>0.113</a:t>
                       </a:r>
                     </a:p>
                   </a:txBody>
-                  <a:tcPr>
+                  <a:tcPr marL="7620" marR="7620" marT="7620" marB="0" anchor="ctr">
                     <a:lnL w="3175" cap="flat" cmpd="sng" algn="ctr">
                       <a:solidFill>
                         <a:schemeClr val="tx1"/>
@@ -10014,14 +10095,20 @@
                     <a:bodyPr/>
                     <a:lstStyle/>
                     <a:p>
-                      <a:pPr algn="ctr"/>
+                      <a:pPr algn="ctr" rtl="0" fontAlgn="ctr"/>
                       <a:r>
-                        <a:rPr lang="en-US" dirty="0"/>
-                        <a:t>0.185</a:t>
+                        <a:rPr lang="en-US" sz="1350" b="0" i="0" u="none" strike="noStrike">
+                          <a:solidFill>
+                            <a:srgbClr val="000000"/>
+                          </a:solidFill>
+                          <a:effectLst/>
+                          <a:latin typeface="Calibri" panose="020F0502020204030204" pitchFamily="34" charset="0"/>
+                        </a:rPr>
+                        <a:t>0.187</a:t>
                       </a:r>
                     </a:p>
                   </a:txBody>
-                  <a:tcPr>
+                  <a:tcPr marL="7620" marR="7620" marT="7620" marB="0" anchor="ctr">
                     <a:lnL w="3175" cap="flat" cmpd="sng" algn="ctr">
                       <a:solidFill>
                         <a:schemeClr val="tx1"/>
@@ -10047,7 +10134,7 @@
                 </a:tc>
                 <a:extLst>
                   <a:ext uri="{0D108BD9-81ED-4DB2-BD59-A6C34878D82A}">
-                    <a16:rowId xmlns:a16="http://schemas.microsoft.com/office/drawing/2014/main" val="191879003"/>
+                    <a16:rowId xmlns:a16="http://schemas.microsoft.com/office/drawing/2014/main" xmlns="" val="191879003"/>
                   </a:ext>
                 </a:extLst>
               </a:tr>
@@ -10057,14 +10144,20 @@
                     <a:bodyPr/>
                     <a:lstStyle/>
                     <a:p>
-                      <a:pPr algn="ctr"/>
+                      <a:pPr algn="ctr" rtl="0" fontAlgn="ctr"/>
                       <a:r>
-                        <a:rPr lang="en-US" dirty="0"/>
+                        <a:rPr lang="en-US" sz="1350" b="0" i="0" u="none" strike="noStrike">
+                          <a:solidFill>
+                            <a:srgbClr val="000000"/>
+                          </a:solidFill>
+                          <a:effectLst/>
+                          <a:latin typeface="Calibri" panose="020F0502020204030204" pitchFamily="34" charset="0"/>
+                        </a:rPr>
                         <a:t>ARIMA(5,1,0)</a:t>
                       </a:r>
                     </a:p>
                   </a:txBody>
-                  <a:tcPr>
+                  <a:tcPr marL="7620" marR="7620" marT="7620" marB="0" anchor="ctr">
                     <a:lnR w="3175" cap="flat" cmpd="sng" algn="ctr">
                       <a:solidFill>
                         <a:schemeClr val="tx1"/>
@@ -10082,14 +10175,20 @@
                     <a:bodyPr/>
                     <a:lstStyle/>
                     <a:p>
-                      <a:pPr algn="ctr"/>
+                      <a:pPr algn="ctr" rtl="0" fontAlgn="ctr"/>
                       <a:r>
-                        <a:rPr lang="en-US" dirty="0"/>
+                        <a:rPr lang="en-US" sz="1350" b="0" i="0" u="none" strike="noStrike">
+                          <a:solidFill>
+                            <a:srgbClr val="000000"/>
+                          </a:solidFill>
+                          <a:effectLst/>
+                          <a:latin typeface="Calibri" panose="020F0502020204030204" pitchFamily="34" charset="0"/>
+                        </a:rPr>
                         <a:t>-2.002</a:t>
                       </a:r>
                     </a:p>
                   </a:txBody>
-                  <a:tcPr>
+                  <a:tcPr marL="7620" marR="7620" marT="7620" marB="0" anchor="ctr">
                     <a:lnL w="3175" cap="flat" cmpd="sng" algn="ctr">
                       <a:solidFill>
                         <a:schemeClr val="tx1"/>
@@ -10116,14 +10215,20 @@
                     <a:bodyPr/>
                     <a:lstStyle/>
                     <a:p>
-                      <a:pPr algn="ctr"/>
+                      <a:pPr algn="ctr" rtl="0" fontAlgn="ctr"/>
                       <a:r>
-                        <a:rPr lang="en-US" dirty="0"/>
+                        <a:rPr lang="en-US" sz="1350" b="0" i="0" u="none" strike="noStrike">
+                          <a:solidFill>
+                            <a:srgbClr val="000000"/>
+                          </a:solidFill>
+                          <a:effectLst/>
+                          <a:latin typeface="Calibri" panose="020F0502020204030204" pitchFamily="34" charset="0"/>
+                        </a:rPr>
                         <a:t>0.203</a:t>
                       </a:r>
                     </a:p>
                   </a:txBody>
-                  <a:tcPr>
+                  <a:tcPr marL="7620" marR="7620" marT="7620" marB="0" anchor="ctr">
                     <a:lnL w="3175" cap="flat" cmpd="sng" algn="ctr">
                       <a:solidFill>
                         <a:schemeClr val="tx1"/>
@@ -10150,14 +10255,20 @@
                     <a:bodyPr/>
                     <a:lstStyle/>
                     <a:p>
-                      <a:pPr algn="ctr"/>
+                      <a:pPr algn="ctr" rtl="0" fontAlgn="ctr"/>
                       <a:r>
-                        <a:rPr lang="en-US" dirty="0"/>
+                        <a:rPr lang="en-US" sz="1350" b="0" i="0" u="none" strike="noStrike" dirty="0">
+                          <a:solidFill>
+                            <a:srgbClr val="000000"/>
+                          </a:solidFill>
+                          <a:effectLst/>
+                          <a:latin typeface="Calibri" panose="020F0502020204030204" pitchFamily="34" charset="0"/>
+                        </a:rPr>
                         <a:t>0.394</a:t>
                       </a:r>
                     </a:p>
                   </a:txBody>
-                  <a:tcPr>
+                  <a:tcPr marL="7620" marR="7620" marT="7620" marB="0" anchor="ctr">
                     <a:lnL w="3175" cap="flat" cmpd="sng" algn="ctr">
                       <a:solidFill>
                         <a:schemeClr val="tx1"/>
@@ -10181,7 +10292,7 @@
                 </a:tc>
                 <a:extLst>
                   <a:ext uri="{0D108BD9-81ED-4DB2-BD59-A6C34878D82A}">
-                    <a16:rowId xmlns:a16="http://schemas.microsoft.com/office/drawing/2014/main" val="2562414764"/>
+                    <a16:rowId xmlns:a16="http://schemas.microsoft.com/office/drawing/2014/main" xmlns="" val="2562414764"/>
                   </a:ext>
                 </a:extLst>
               </a:tr>
@@ -10194,7 +10305,7 @@
           <p:cNvPr id="5" name="TextBox 4">
             <a:extLst>
               <a:ext uri="{FF2B5EF4-FFF2-40B4-BE49-F238E27FC236}">
-                <a16:creationId xmlns:a16="http://schemas.microsoft.com/office/drawing/2014/main" id="{BE7A8CB2-192E-4525-8763-FC5AB9C2D432}"/>
+                <a16:creationId xmlns:a16="http://schemas.microsoft.com/office/drawing/2014/main" xmlns="" id="{BE7A8CB2-192E-4525-8763-FC5AB9C2D432}"/>
               </a:ext>
             </a:extLst>
           </p:cNvPr>
@@ -10229,7 +10340,7 @@
           <p:cNvPr id="11" name="TextBox 10">
             <a:extLst>
               <a:ext uri="{FF2B5EF4-FFF2-40B4-BE49-F238E27FC236}">
-                <a16:creationId xmlns:a16="http://schemas.microsoft.com/office/drawing/2014/main" id="{88680CFF-5F04-44CE-9A64-4414B7233E89}"/>
+                <a16:creationId xmlns:a16="http://schemas.microsoft.com/office/drawing/2014/main" xmlns="" id="{88680CFF-5F04-44CE-9A64-4414B7233E89}"/>
               </a:ext>
             </a:extLst>
           </p:cNvPr>
@@ -10308,7 +10419,7 @@
           <p:cNvPr id="2" name="Title 1">
             <a:extLst>
               <a:ext uri="{FF2B5EF4-FFF2-40B4-BE49-F238E27FC236}">
-                <a16:creationId xmlns:a16="http://schemas.microsoft.com/office/drawing/2014/main" id="{35AF407F-225A-4172-B3D9-88A68FDB32F8}"/>
+                <a16:creationId xmlns:a16="http://schemas.microsoft.com/office/drawing/2014/main" xmlns="" id="{35AF407F-225A-4172-B3D9-88A68FDB32F8}"/>
               </a:ext>
             </a:extLst>
           </p:cNvPr>
@@ -10336,7 +10447,7 @@
           <p:cNvPr id="7" name="TextBox 6">
             <a:extLst>
               <a:ext uri="{FF2B5EF4-FFF2-40B4-BE49-F238E27FC236}">
-                <a16:creationId xmlns:a16="http://schemas.microsoft.com/office/drawing/2014/main" id="{049991B8-0F7A-43D4-868B-CB72E066B2A6}"/>
+                <a16:creationId xmlns:a16="http://schemas.microsoft.com/office/drawing/2014/main" xmlns="" id="{049991B8-0F7A-43D4-868B-CB72E066B2A6}"/>
               </a:ext>
             </a:extLst>
           </p:cNvPr>
@@ -10377,7 +10488,7 @@
           <p:cNvPr id="6" name="Picture 5">
             <a:extLst>
               <a:ext uri="{FF2B5EF4-FFF2-40B4-BE49-F238E27FC236}">
-                <a16:creationId xmlns:a16="http://schemas.microsoft.com/office/drawing/2014/main" id="{20712D6C-C9E1-43B1-A8D2-B44E9187BD27}"/>
+                <a16:creationId xmlns:a16="http://schemas.microsoft.com/office/drawing/2014/main" xmlns="" id="{20712D6C-C9E1-43B1-A8D2-B44E9187BD27}"/>
               </a:ext>
             </a:extLst>
           </p:cNvPr>
@@ -10407,7 +10518,7 @@
           <p:cNvPr id="8" name="TextBox 7">
             <a:extLst>
               <a:ext uri="{FF2B5EF4-FFF2-40B4-BE49-F238E27FC236}">
-                <a16:creationId xmlns:a16="http://schemas.microsoft.com/office/drawing/2014/main" id="{A738AA6E-AA86-45DC-B995-F3282AE8BCD8}"/>
+                <a16:creationId xmlns:a16="http://schemas.microsoft.com/office/drawing/2014/main" xmlns="" id="{A738AA6E-AA86-45DC-B995-F3282AE8BCD8}"/>
               </a:ext>
             </a:extLst>
           </p:cNvPr>
@@ -10448,7 +10559,7 @@
           <p:cNvPr id="10" name="Picture 9">
             <a:extLst>
               <a:ext uri="{FF2B5EF4-FFF2-40B4-BE49-F238E27FC236}">
-                <a16:creationId xmlns:a16="http://schemas.microsoft.com/office/drawing/2014/main" id="{9F933DFF-4D95-4FA7-B4AD-C10B1458679B}"/>
+                <a16:creationId xmlns:a16="http://schemas.microsoft.com/office/drawing/2014/main" xmlns="" id="{9F933DFF-4D95-4FA7-B4AD-C10B1458679B}"/>
               </a:ext>
             </a:extLst>
           </p:cNvPr>
@@ -10478,7 +10589,7 @@
           <p:cNvPr id="11" name="Picture 10">
             <a:extLst>
               <a:ext uri="{FF2B5EF4-FFF2-40B4-BE49-F238E27FC236}">
-                <a16:creationId xmlns:a16="http://schemas.microsoft.com/office/drawing/2014/main" id="{C132A209-8528-4560-BF30-16EFDE28AAEA}"/>
+                <a16:creationId xmlns:a16="http://schemas.microsoft.com/office/drawing/2014/main" xmlns="" id="{C132A209-8528-4560-BF30-16EFDE28AAEA}"/>
               </a:ext>
             </a:extLst>
           </p:cNvPr>
@@ -10496,7 +10607,7 @@
         <p:spPr>
           <a:xfrm>
             <a:off x="4518659" y="1442554"/>
-            <a:ext cx="3856625" cy="2748446"/>
+            <a:ext cx="3856625" cy="2560913"/>
           </a:xfrm>
           <a:prstGeom prst="rect">
             <a:avLst/>
@@ -10508,7 +10619,7 @@
           <p:cNvPr id="12" name="TextBox 11">
             <a:extLst>
               <a:ext uri="{FF2B5EF4-FFF2-40B4-BE49-F238E27FC236}">
-                <a16:creationId xmlns:a16="http://schemas.microsoft.com/office/drawing/2014/main" id="{9711FA6D-AA16-4DE5-A48A-ACED9D875198}"/>
+                <a16:creationId xmlns:a16="http://schemas.microsoft.com/office/drawing/2014/main" xmlns="" id="{9711FA6D-AA16-4DE5-A48A-ACED9D875198}"/>
               </a:ext>
             </a:extLst>
           </p:cNvPr>
@@ -10544,6 +10655,30 @@
           </a:p>
         </p:txBody>
       </p:sp>
+      <p:pic>
+        <p:nvPicPr>
+          <p:cNvPr id="4" name="Picture 3"/>
+          <p:cNvPicPr>
+            <a:picLocks noChangeAspect="1"/>
+          </p:cNvPicPr>
+          <p:nvPr/>
+        </p:nvPicPr>
+        <p:blipFill>
+          <a:blip r:embed="rId6"/>
+          <a:stretch>
+            <a:fillRect/>
+          </a:stretch>
+        </p:blipFill>
+        <p:spPr>
+          <a:xfrm>
+            <a:off x="4061289" y="1713861"/>
+            <a:ext cx="4313995" cy="2476311"/>
+          </a:xfrm>
+          <a:prstGeom prst="rect">
+            <a:avLst/>
+          </a:prstGeom>
+        </p:spPr>
+      </p:pic>
     </p:spTree>
     <p:extLst>
       <p:ext uri="{BB962C8B-B14F-4D97-AF65-F5344CB8AC3E}">
@@ -10587,7 +10722,7 @@
           <p:cNvPr id="2" name="Title 1">
             <a:extLst>
               <a:ext uri="{FF2B5EF4-FFF2-40B4-BE49-F238E27FC236}">
-                <a16:creationId xmlns:a16="http://schemas.microsoft.com/office/drawing/2014/main" id="{35AF407F-225A-4172-B3D9-88A68FDB32F8}"/>
+                <a16:creationId xmlns:a16="http://schemas.microsoft.com/office/drawing/2014/main" xmlns="" id="{35AF407F-225A-4172-B3D9-88A68FDB32F8}"/>
               </a:ext>
             </a:extLst>
           </p:cNvPr>
@@ -10615,7 +10750,7 @@
           <p:cNvPr id="7" name="TextBox 6">
             <a:extLst>
               <a:ext uri="{FF2B5EF4-FFF2-40B4-BE49-F238E27FC236}">
-                <a16:creationId xmlns:a16="http://schemas.microsoft.com/office/drawing/2014/main" id="{049991B8-0F7A-43D4-868B-CB72E066B2A6}"/>
+                <a16:creationId xmlns:a16="http://schemas.microsoft.com/office/drawing/2014/main" xmlns="" id="{049991B8-0F7A-43D4-868B-CB72E066B2A6}"/>
               </a:ext>
             </a:extLst>
           </p:cNvPr>
@@ -10656,7 +10791,7 @@
           <p:cNvPr id="8" name="TextBox 7">
             <a:extLst>
               <a:ext uri="{FF2B5EF4-FFF2-40B4-BE49-F238E27FC236}">
-                <a16:creationId xmlns:a16="http://schemas.microsoft.com/office/drawing/2014/main" id="{A738AA6E-AA86-45DC-B995-F3282AE8BCD8}"/>
+                <a16:creationId xmlns:a16="http://schemas.microsoft.com/office/drawing/2014/main" xmlns="" id="{A738AA6E-AA86-45DC-B995-F3282AE8BCD8}"/>
               </a:ext>
             </a:extLst>
           </p:cNvPr>
@@ -10697,7 +10832,7 @@
           <p:cNvPr id="16" name="Content Placeholder 15">
             <a:extLst>
               <a:ext uri="{FF2B5EF4-FFF2-40B4-BE49-F238E27FC236}">
-                <a16:creationId xmlns:a16="http://schemas.microsoft.com/office/drawing/2014/main" id="{D22B554A-C587-49D2-96E2-B4D8923D1862}"/>
+                <a16:creationId xmlns:a16="http://schemas.microsoft.com/office/drawing/2014/main" xmlns="" id="{D22B554A-C587-49D2-96E2-B4D8923D1862}"/>
               </a:ext>
             </a:extLst>
           </p:cNvPr>
@@ -10729,7 +10864,7 @@
           <p:cNvPr id="6" name="Content Placeholder 5">
             <a:extLst>
               <a:ext uri="{FF2B5EF4-FFF2-40B4-BE49-F238E27FC236}">
-                <a16:creationId xmlns:a16="http://schemas.microsoft.com/office/drawing/2014/main" id="{7F95BA3B-4788-43C9-8827-DDDFAC652316}"/>
+                <a16:creationId xmlns:a16="http://schemas.microsoft.com/office/drawing/2014/main" xmlns="" id="{7F95BA3B-4788-43C9-8827-DDDFAC652316}"/>
               </a:ext>
             </a:extLst>
           </p:cNvPr>
@@ -10799,7 +10934,7 @@
           <p:cNvPr id="5" name="Title 4">
             <a:extLst>
               <a:ext uri="{FF2B5EF4-FFF2-40B4-BE49-F238E27FC236}">
-                <a16:creationId xmlns:a16="http://schemas.microsoft.com/office/drawing/2014/main" id="{0B94A83C-3031-4E46-8370-8A64014F2000}"/>
+                <a16:creationId xmlns:a16="http://schemas.microsoft.com/office/drawing/2014/main" xmlns="" id="{0B94A83C-3031-4E46-8370-8A64014F2000}"/>
               </a:ext>
             </a:extLst>
           </p:cNvPr>
@@ -10827,7 +10962,7 @@
           <p:cNvPr id="6" name="Content Placeholder 5">
             <a:extLst>
               <a:ext uri="{FF2B5EF4-FFF2-40B4-BE49-F238E27FC236}">
-                <a16:creationId xmlns:a16="http://schemas.microsoft.com/office/drawing/2014/main" id="{195F6A7F-CBC3-4950-8263-2E25C6ACEA11}"/>
+                <a16:creationId xmlns:a16="http://schemas.microsoft.com/office/drawing/2014/main" xmlns="" id="{195F6A7F-CBC3-4950-8263-2E25C6ACEA11}"/>
               </a:ext>
             </a:extLst>
           </p:cNvPr>
@@ -10891,7 +11026,7 @@
           <p:cNvPr id="2" name="Title 1">
             <a:extLst>
               <a:ext uri="{FF2B5EF4-FFF2-40B4-BE49-F238E27FC236}">
-                <a16:creationId xmlns:a16="http://schemas.microsoft.com/office/drawing/2014/main" id="{5B931770-76C9-F749-9B7D-08A4A1F13896}"/>
+                <a16:creationId xmlns:a16="http://schemas.microsoft.com/office/drawing/2014/main" xmlns="" id="{5B931770-76C9-F749-9B7D-08A4A1F13896}"/>
               </a:ext>
             </a:extLst>
           </p:cNvPr>
@@ -10919,7 +11054,7 @@
           <p:cNvPr id="30" name="TextBox 29">
             <a:extLst>
               <a:ext uri="{FF2B5EF4-FFF2-40B4-BE49-F238E27FC236}">
-                <a16:creationId xmlns:a16="http://schemas.microsoft.com/office/drawing/2014/main" id="{43A13C87-2B73-4493-9185-1D2D5B834571}"/>
+                <a16:creationId xmlns:a16="http://schemas.microsoft.com/office/drawing/2014/main" xmlns="" id="{43A13C87-2B73-4493-9185-1D2D5B834571}"/>
               </a:ext>
             </a:extLst>
           </p:cNvPr>
@@ -10954,7 +11089,7 @@
           <p:cNvPr id="31" name="TextBox 30">
             <a:extLst>
               <a:ext uri="{FF2B5EF4-FFF2-40B4-BE49-F238E27FC236}">
-                <a16:creationId xmlns:a16="http://schemas.microsoft.com/office/drawing/2014/main" id="{781EAA0D-ECA2-42B0-8DB9-97F33B55C9FE}"/>
+                <a16:creationId xmlns:a16="http://schemas.microsoft.com/office/drawing/2014/main" xmlns="" id="{781EAA0D-ECA2-42B0-8DB9-97F33B55C9FE}"/>
               </a:ext>
             </a:extLst>
           </p:cNvPr>
@@ -10989,7 +11124,7 @@
           <p:cNvPr id="33" name="TextBox 32">
             <a:extLst>
               <a:ext uri="{FF2B5EF4-FFF2-40B4-BE49-F238E27FC236}">
-                <a16:creationId xmlns:a16="http://schemas.microsoft.com/office/drawing/2014/main" id="{EC2EA415-AFEF-434C-A691-8BCD28411A91}"/>
+                <a16:creationId xmlns:a16="http://schemas.microsoft.com/office/drawing/2014/main" xmlns="" id="{EC2EA415-AFEF-434C-A691-8BCD28411A91}"/>
               </a:ext>
             </a:extLst>
           </p:cNvPr>
@@ -11024,7 +11159,7 @@
           <p:cNvPr id="4" name="Graphic 3" descr="Magnifying glass">
             <a:extLst>
               <a:ext uri="{FF2B5EF4-FFF2-40B4-BE49-F238E27FC236}">
-                <a16:creationId xmlns:a16="http://schemas.microsoft.com/office/drawing/2014/main" id="{396C3828-42E6-41FF-B176-5EB81CF5EC90}"/>
+                <a16:creationId xmlns:a16="http://schemas.microsoft.com/office/drawing/2014/main" xmlns="" id="{396C3828-42E6-41FF-B176-5EB81CF5EC90}"/>
               </a:ext>
             </a:extLst>
           </p:cNvPr>
@@ -11037,7 +11172,7 @@
           <a:blip r:embed="rId3">
             <a:extLst>
               <a:ext uri="{96DAC541-7B7A-43D3-8B79-37D633B846F1}">
-                <asvg:svgBlip xmlns:asvg="http://schemas.microsoft.com/office/drawing/2016/SVG/main" r:embed="rId4"/>
+                <asvg:svgBlip xmlns:asvg="http://schemas.microsoft.com/office/drawing/2016/SVG/main" xmlns="" r:embed="rId4"/>
               </a:ext>
             </a:extLst>
           </a:blip>
@@ -11060,7 +11195,7 @@
           <p:cNvPr id="22" name="TextBox 21">
             <a:extLst>
               <a:ext uri="{FF2B5EF4-FFF2-40B4-BE49-F238E27FC236}">
-                <a16:creationId xmlns:a16="http://schemas.microsoft.com/office/drawing/2014/main" id="{D408EBB5-8E36-4986-833F-FEF2D86F3F9D}"/>
+                <a16:creationId xmlns:a16="http://schemas.microsoft.com/office/drawing/2014/main" xmlns="" id="{D408EBB5-8E36-4986-833F-FEF2D86F3F9D}"/>
               </a:ext>
             </a:extLst>
           </p:cNvPr>
@@ -11095,7 +11230,7 @@
           <p:cNvPr id="16" name="Graphic 15" descr="Presentation with pie chart">
             <a:extLst>
               <a:ext uri="{FF2B5EF4-FFF2-40B4-BE49-F238E27FC236}">
-                <a16:creationId xmlns:a16="http://schemas.microsoft.com/office/drawing/2014/main" id="{14F18DF2-38B0-4CD1-B964-DB64968836BA}"/>
+                <a16:creationId xmlns:a16="http://schemas.microsoft.com/office/drawing/2014/main" xmlns="" id="{14F18DF2-38B0-4CD1-B964-DB64968836BA}"/>
               </a:ext>
             </a:extLst>
           </p:cNvPr>
@@ -11108,7 +11243,7 @@
           <a:blip r:embed="rId5">
             <a:extLst>
               <a:ext uri="{96DAC541-7B7A-43D3-8B79-37D633B846F1}">
-                <asvg:svgBlip xmlns:asvg="http://schemas.microsoft.com/office/drawing/2016/SVG/main" r:embed="rId6"/>
+                <asvg:svgBlip xmlns:asvg="http://schemas.microsoft.com/office/drawing/2016/SVG/main" xmlns="" r:embed="rId6"/>
               </a:ext>
             </a:extLst>
           </a:blip>
@@ -11131,7 +11266,7 @@
           <p:cNvPr id="18" name="Graphic 17" descr="Checklist RTL">
             <a:extLst>
               <a:ext uri="{FF2B5EF4-FFF2-40B4-BE49-F238E27FC236}">
-                <a16:creationId xmlns:a16="http://schemas.microsoft.com/office/drawing/2014/main" id="{08B526E1-E252-4DAF-BEDF-5D1DF447F12E}"/>
+                <a16:creationId xmlns:a16="http://schemas.microsoft.com/office/drawing/2014/main" xmlns="" id="{08B526E1-E252-4DAF-BEDF-5D1DF447F12E}"/>
               </a:ext>
             </a:extLst>
           </p:cNvPr>
@@ -11144,7 +11279,7 @@
           <a:blip r:embed="rId7">
             <a:extLst>
               <a:ext uri="{96DAC541-7B7A-43D3-8B79-37D633B846F1}">
-                <asvg:svgBlip xmlns:asvg="http://schemas.microsoft.com/office/drawing/2016/SVG/main" r:embed="rId8"/>
+                <asvg:svgBlip xmlns:asvg="http://schemas.microsoft.com/office/drawing/2016/SVG/main" xmlns="" r:embed="rId8"/>
               </a:ext>
             </a:extLst>
           </a:blip>
@@ -11167,7 +11302,7 @@
           <p:cNvPr id="13" name="Graphic 12" descr="Venn diagram">
             <a:extLst>
               <a:ext uri="{FF2B5EF4-FFF2-40B4-BE49-F238E27FC236}">
-                <a16:creationId xmlns:a16="http://schemas.microsoft.com/office/drawing/2014/main" id="{3CA8221C-99E4-40BB-8AEF-433A7617F06A}"/>
+                <a16:creationId xmlns:a16="http://schemas.microsoft.com/office/drawing/2014/main" xmlns="" id="{3CA8221C-99E4-40BB-8AEF-433A7617F06A}"/>
               </a:ext>
             </a:extLst>
           </p:cNvPr>
@@ -11180,7 +11315,7 @@
           <a:blip r:embed="rId9">
             <a:extLst>
               <a:ext uri="{96DAC541-7B7A-43D3-8B79-37D633B846F1}">
-                <asvg:svgBlip xmlns:asvg="http://schemas.microsoft.com/office/drawing/2016/SVG/main" r:embed="rId10"/>
+                <asvg:svgBlip xmlns:asvg="http://schemas.microsoft.com/office/drawing/2016/SVG/main" xmlns="" r:embed="rId10"/>
               </a:ext>
             </a:extLst>
           </a:blip>
@@ -11203,7 +11338,7 @@
           <p:cNvPr id="7" name="Graphic 6" descr="Decision chart">
             <a:extLst>
               <a:ext uri="{FF2B5EF4-FFF2-40B4-BE49-F238E27FC236}">
-                <a16:creationId xmlns:a16="http://schemas.microsoft.com/office/drawing/2014/main" id="{F4AF76BE-9DDF-481B-958C-A6F4F5270DC6}"/>
+                <a16:creationId xmlns:a16="http://schemas.microsoft.com/office/drawing/2014/main" xmlns="" id="{F4AF76BE-9DDF-481B-958C-A6F4F5270DC6}"/>
               </a:ext>
             </a:extLst>
           </p:cNvPr>
@@ -11216,7 +11351,7 @@
           <a:blip r:embed="rId11">
             <a:extLst>
               <a:ext uri="{96DAC541-7B7A-43D3-8B79-37D633B846F1}">
-                <asvg:svgBlip xmlns:asvg="http://schemas.microsoft.com/office/drawing/2016/SVG/main" r:embed="rId12"/>
+                <asvg:svgBlip xmlns:asvg="http://schemas.microsoft.com/office/drawing/2016/SVG/main" xmlns="" r:embed="rId12"/>
               </a:ext>
             </a:extLst>
           </a:blip>
@@ -11239,7 +11374,7 @@
           <p:cNvPr id="17" name="TextBox 16">
             <a:extLst>
               <a:ext uri="{FF2B5EF4-FFF2-40B4-BE49-F238E27FC236}">
-                <a16:creationId xmlns:a16="http://schemas.microsoft.com/office/drawing/2014/main" id="{69CAAAFD-E50D-496E-B536-F485D1CB8585}"/>
+                <a16:creationId xmlns:a16="http://schemas.microsoft.com/office/drawing/2014/main" xmlns="" id="{69CAAAFD-E50D-496E-B536-F485D1CB8585}"/>
               </a:ext>
             </a:extLst>
           </p:cNvPr>
@@ -11312,7 +11447,7 @@
           <p:cNvPr id="3" name="Title 2">
             <a:extLst>
               <a:ext uri="{FF2B5EF4-FFF2-40B4-BE49-F238E27FC236}">
-                <a16:creationId xmlns:a16="http://schemas.microsoft.com/office/drawing/2014/main" id="{36B254F5-DC72-4562-8F86-48E0452A25E2}"/>
+                <a16:creationId xmlns:a16="http://schemas.microsoft.com/office/drawing/2014/main" xmlns="" id="{36B254F5-DC72-4562-8F86-48E0452A25E2}"/>
               </a:ext>
             </a:extLst>
           </p:cNvPr>
@@ -11340,7 +11475,7 @@
           <p:cNvPr id="4" name="Content Placeholder 3">
             <a:extLst>
               <a:ext uri="{FF2B5EF4-FFF2-40B4-BE49-F238E27FC236}">
-                <a16:creationId xmlns:a16="http://schemas.microsoft.com/office/drawing/2014/main" id="{0FC3FB72-4BB4-4F02-99C6-4D6420A04601}"/>
+                <a16:creationId xmlns:a16="http://schemas.microsoft.com/office/drawing/2014/main" xmlns="" id="{0FC3FB72-4BB4-4F02-99C6-4D6420A04601}"/>
               </a:ext>
             </a:extLst>
           </p:cNvPr>
@@ -11418,7 +11553,7 @@
           <p:cNvPr id="7" name="Graphic 6" descr="Filter">
             <a:extLst>
               <a:ext uri="{FF2B5EF4-FFF2-40B4-BE49-F238E27FC236}">
-                <a16:creationId xmlns:a16="http://schemas.microsoft.com/office/drawing/2014/main" id="{2CE85E56-D0C8-4C13-BC98-E286AF6B9355}"/>
+                <a16:creationId xmlns:a16="http://schemas.microsoft.com/office/drawing/2014/main" xmlns="" id="{2CE85E56-D0C8-4C13-BC98-E286AF6B9355}"/>
               </a:ext>
             </a:extLst>
           </p:cNvPr>
@@ -11431,7 +11566,7 @@
           <a:blip r:embed="rId3">
             <a:extLst>
               <a:ext uri="{96DAC541-7B7A-43D3-8B79-37D633B846F1}">
-                <asvg:svgBlip xmlns:asvg="http://schemas.microsoft.com/office/drawing/2016/SVG/main" r:embed="rId4"/>
+                <asvg:svgBlip xmlns:asvg="http://schemas.microsoft.com/office/drawing/2016/SVG/main" xmlns="" r:embed="rId4"/>
               </a:ext>
             </a:extLst>
           </a:blip>
@@ -11454,7 +11589,7 @@
           <p:cNvPr id="9" name="Content Placeholder 3">
             <a:extLst>
               <a:ext uri="{FF2B5EF4-FFF2-40B4-BE49-F238E27FC236}">
-                <a16:creationId xmlns:a16="http://schemas.microsoft.com/office/drawing/2014/main" id="{70488FF4-D98F-458D-9D44-65E2E0BC28E8}"/>
+                <a16:creationId xmlns:a16="http://schemas.microsoft.com/office/drawing/2014/main" xmlns="" id="{70488FF4-D98F-458D-9D44-65E2E0BC28E8}"/>
               </a:ext>
             </a:extLst>
           </p:cNvPr>
@@ -11663,7 +11798,7 @@
           <p:cNvPr id="17" name="TextBox 16">
             <a:extLst>
               <a:ext uri="{FF2B5EF4-FFF2-40B4-BE49-F238E27FC236}">
-                <a16:creationId xmlns:a16="http://schemas.microsoft.com/office/drawing/2014/main" id="{3BDAB8A6-09E9-4B41-AF1E-EF3621840919}"/>
+                <a16:creationId xmlns:a16="http://schemas.microsoft.com/office/drawing/2014/main" xmlns="" id="{3BDAB8A6-09E9-4B41-AF1E-EF3621840919}"/>
               </a:ext>
             </a:extLst>
           </p:cNvPr>
@@ -11704,7 +11839,7 @@
           <p:cNvPr id="18" name="TextBox 17">
             <a:extLst>
               <a:ext uri="{FF2B5EF4-FFF2-40B4-BE49-F238E27FC236}">
-                <a16:creationId xmlns:a16="http://schemas.microsoft.com/office/drawing/2014/main" id="{00662D91-4BF1-4CDB-887A-EAA3A1906B11}"/>
+                <a16:creationId xmlns:a16="http://schemas.microsoft.com/office/drawing/2014/main" xmlns="" id="{00662D91-4BF1-4CDB-887A-EAA3A1906B11}"/>
               </a:ext>
             </a:extLst>
           </p:cNvPr>
@@ -11745,7 +11880,7 @@
           <p:cNvPr id="19" name="TextBox 18">
             <a:extLst>
               <a:ext uri="{FF2B5EF4-FFF2-40B4-BE49-F238E27FC236}">
-                <a16:creationId xmlns:a16="http://schemas.microsoft.com/office/drawing/2014/main" id="{55B129DC-1A81-45AA-9234-5264D423F868}"/>
+                <a16:creationId xmlns:a16="http://schemas.microsoft.com/office/drawing/2014/main" xmlns="" id="{55B129DC-1A81-45AA-9234-5264D423F868}"/>
               </a:ext>
             </a:extLst>
           </p:cNvPr>
@@ -11786,7 +11921,7 @@
           <p:cNvPr id="20" name="TextBox 19">
             <a:extLst>
               <a:ext uri="{FF2B5EF4-FFF2-40B4-BE49-F238E27FC236}">
-                <a16:creationId xmlns:a16="http://schemas.microsoft.com/office/drawing/2014/main" id="{B55E523C-A88C-4153-94A4-DC6F685AE20B}"/>
+                <a16:creationId xmlns:a16="http://schemas.microsoft.com/office/drawing/2014/main" xmlns="" id="{B55E523C-A88C-4153-94A4-DC6F685AE20B}"/>
               </a:ext>
             </a:extLst>
           </p:cNvPr>
@@ -11827,7 +11962,7 @@
           <p:cNvPr id="21" name="TextBox 20">
             <a:extLst>
               <a:ext uri="{FF2B5EF4-FFF2-40B4-BE49-F238E27FC236}">
-                <a16:creationId xmlns:a16="http://schemas.microsoft.com/office/drawing/2014/main" id="{F90FDCA8-45CE-4C0E-AFB0-03DC9060B280}"/>
+                <a16:creationId xmlns:a16="http://schemas.microsoft.com/office/drawing/2014/main" xmlns="" id="{F90FDCA8-45CE-4C0E-AFB0-03DC9060B280}"/>
               </a:ext>
             </a:extLst>
           </p:cNvPr>
@@ -11862,7 +11997,7 @@
           <p:cNvPr id="22" name="TextBox 21">
             <a:extLst>
               <a:ext uri="{FF2B5EF4-FFF2-40B4-BE49-F238E27FC236}">
-                <a16:creationId xmlns:a16="http://schemas.microsoft.com/office/drawing/2014/main" id="{29F489E0-15EA-4B09-9CDC-C121253A18CD}"/>
+                <a16:creationId xmlns:a16="http://schemas.microsoft.com/office/drawing/2014/main" xmlns="" id="{29F489E0-15EA-4B09-9CDC-C121253A18CD}"/>
               </a:ext>
             </a:extLst>
           </p:cNvPr>
@@ -11901,7 +12036,7 @@
           <p:cNvPr id="23" name="TextBox 22">
             <a:extLst>
               <a:ext uri="{FF2B5EF4-FFF2-40B4-BE49-F238E27FC236}">
-                <a16:creationId xmlns:a16="http://schemas.microsoft.com/office/drawing/2014/main" id="{C1BA92E8-D4F5-4209-9BD5-0DDE7EB6B89B}"/>
+                <a16:creationId xmlns:a16="http://schemas.microsoft.com/office/drawing/2014/main" xmlns="" id="{C1BA92E8-D4F5-4209-9BD5-0DDE7EB6B89B}"/>
               </a:ext>
             </a:extLst>
           </p:cNvPr>
@@ -11936,7 +12071,7 @@
           <p:cNvPr id="24" name="TextBox 23">
             <a:extLst>
               <a:ext uri="{FF2B5EF4-FFF2-40B4-BE49-F238E27FC236}">
-                <a16:creationId xmlns:a16="http://schemas.microsoft.com/office/drawing/2014/main" id="{1281DA6C-65E1-410A-A62D-98348B5E99E2}"/>
+                <a16:creationId xmlns:a16="http://schemas.microsoft.com/office/drawing/2014/main" xmlns="" id="{1281DA6C-65E1-410A-A62D-98348B5E99E2}"/>
               </a:ext>
             </a:extLst>
           </p:cNvPr>
@@ -11971,7 +12106,7 @@
           <p:cNvPr id="33" name="Rectangle 32">
             <a:extLst>
               <a:ext uri="{FF2B5EF4-FFF2-40B4-BE49-F238E27FC236}">
-                <a16:creationId xmlns:a16="http://schemas.microsoft.com/office/drawing/2014/main" id="{A0714868-EDDE-4A16-A640-B9B688C2168C}"/>
+                <a16:creationId xmlns:a16="http://schemas.microsoft.com/office/drawing/2014/main" xmlns="" id="{A0714868-EDDE-4A16-A640-B9B688C2168C}"/>
               </a:ext>
             </a:extLst>
           </p:cNvPr>
@@ -12012,7 +12147,7 @@
           <p:cNvPr id="35" name="Graphic 34" descr="Upward trend">
             <a:extLst>
               <a:ext uri="{FF2B5EF4-FFF2-40B4-BE49-F238E27FC236}">
-                <a16:creationId xmlns:a16="http://schemas.microsoft.com/office/drawing/2014/main" id="{849DCB03-5C2F-47C8-825E-A0BACDAB3796}"/>
+                <a16:creationId xmlns:a16="http://schemas.microsoft.com/office/drawing/2014/main" xmlns="" id="{849DCB03-5C2F-47C8-825E-A0BACDAB3796}"/>
               </a:ext>
             </a:extLst>
           </p:cNvPr>
@@ -12025,7 +12160,7 @@
           <a:blip r:embed="rId5">
             <a:extLst>
               <a:ext uri="{96DAC541-7B7A-43D3-8B79-37D633B846F1}">
-                <asvg:svgBlip xmlns:asvg="http://schemas.microsoft.com/office/drawing/2016/SVG/main" r:embed="rId6"/>
+                <asvg:svgBlip xmlns:asvg="http://schemas.microsoft.com/office/drawing/2016/SVG/main" xmlns="" r:embed="rId6"/>
               </a:ext>
             </a:extLst>
           </a:blip>
@@ -12083,10 +12218,10 @@
       </p:grpSpPr>
       <p:sp>
         <p:nvSpPr>
-          <p:cNvPr id="5" name="Title 4">
+          <p:cNvPr id="2" name="Title 1">
             <a:extLst>
               <a:ext uri="{FF2B5EF4-FFF2-40B4-BE49-F238E27FC236}">
-                <a16:creationId xmlns:a16="http://schemas.microsoft.com/office/drawing/2014/main" id="{5BF6937D-FA03-419D-8AF1-687DA1ADB403}"/>
+                <a16:creationId xmlns:a16="http://schemas.microsoft.com/office/drawing/2014/main" xmlns="" id="{37F7B9A7-F1BA-40D8-AAD5-15C8D6C4F544}"/>
               </a:ext>
             </a:extLst>
           </p:cNvPr>
@@ -12097,53 +12232,73 @@
             <p:ph type="title"/>
           </p:nvPr>
         </p:nvSpPr>
-        <p:spPr/>
+        <p:spPr>
+          <a:xfrm>
+            <a:off x="315686" y="365126"/>
+            <a:ext cx="8386989" cy="1325563"/>
+          </a:xfrm>
+        </p:spPr>
         <p:txBody>
           <a:bodyPr/>
           <a:lstStyle/>
           <a:p>
             <a:r>
               <a:rPr lang="en-US" dirty="0"/>
-              <a:t>About the Data: Data Preprocessing</a:t>
-            </a:r>
-          </a:p>
-        </p:txBody>
-      </p:sp>
-      <p:pic>
-        <p:nvPicPr>
-          <p:cNvPr id="11" name="Content Placeholder 10" descr="A close up of a map&#10;&#10;Description automatically generated">
+              <a:t>Model Type and </a:t>
+            </a:r>
+            <a:r>
+              <a:rPr lang="en-US" dirty="0" smtClean="0"/>
+              <a:t>Properties: Data Preprocessing</a:t>
+            </a:r>
+            <a:endParaRPr lang="en-US" dirty="0"/>
+          </a:p>
+        </p:txBody>
+      </p:sp>
+      <p:sp>
+        <p:nvSpPr>
+          <p:cNvPr id="6" name="Text Placeholder 5">
             <a:extLst>
               <a:ext uri="{FF2B5EF4-FFF2-40B4-BE49-F238E27FC236}">
-                <a16:creationId xmlns:a16="http://schemas.microsoft.com/office/drawing/2014/main" id="{22C41C69-3208-4AC6-BE0A-4C3360370BB9}"/>
+                <a16:creationId xmlns:a16="http://schemas.microsoft.com/office/drawing/2014/main" xmlns="" id="{5EE670F9-63B2-4A30-82F1-A21CB25126C9}"/>
               </a:ext>
             </a:extLst>
           </p:cNvPr>
-          <p:cNvPicPr>
-            <a:picLocks noGrp="1" noChangeAspect="1"/>
-          </p:cNvPicPr>
+          <p:cNvSpPr>
+            <a:spLocks noGrp="1"/>
+          </p:cNvSpPr>
           <p:nvPr>
-            <p:ph sz="half" idx="2"/>
+            <p:ph type="body" idx="1"/>
           </p:nvPr>
-        </p:nvPicPr>
-        <p:blipFill>
-          <a:blip r:embed="rId3"/>
-          <a:stretch>
-            <a:fillRect/>
-          </a:stretch>
-        </p:blipFill>
+        </p:nvSpPr>
         <p:spPr>
           <a:xfrm>
-            <a:off x="325438" y="2380667"/>
-            <a:ext cx="4424741" cy="2844476"/>
+            <a:off x="420528" y="4017646"/>
+            <a:ext cx="3868340" cy="627697"/>
           </a:xfrm>
         </p:spPr>
-      </p:pic>
+        <p:txBody>
+          <a:bodyPr anchor="t">
+            <a:noAutofit/>
+          </a:bodyPr>
+          <a:lstStyle/>
+          <a:p>
+            <a:r>
+              <a:rPr lang="en-US" sz="2000" dirty="0">
+                <a:solidFill>
+                  <a:srgbClr val="002060"/>
+                </a:solidFill>
+              </a:rPr>
+              <a:t>Original Data Spectral Density and ACF</a:t>
+            </a:r>
+          </a:p>
+        </p:txBody>
+      </p:sp>
       <p:sp>
         <p:nvSpPr>
           <p:cNvPr id="8" name="Text Placeholder 7">
             <a:extLst>
               <a:ext uri="{FF2B5EF4-FFF2-40B4-BE49-F238E27FC236}">
-                <a16:creationId xmlns:a16="http://schemas.microsoft.com/office/drawing/2014/main" id="{0BA0A838-3481-43C2-8535-FA48BEA08A33}"/>
+                <a16:creationId xmlns:a16="http://schemas.microsoft.com/office/drawing/2014/main" xmlns="" id="{00FCA8AF-A1AF-4C36-BBAB-977C4EC38E30}"/>
               </a:ext>
             </a:extLst>
           </p:cNvPr>
@@ -12156,25 +12311,23 @@
         </p:nvSpPr>
         <p:spPr>
           <a:xfrm>
-            <a:off x="5082073" y="2340527"/>
-            <a:ext cx="3490451" cy="508421"/>
+            <a:off x="420528" y="1627347"/>
+            <a:ext cx="3887391" cy="627697"/>
           </a:xfrm>
         </p:spPr>
         <p:txBody>
-          <a:bodyPr>
-            <a:normAutofit fontScale="92500" lnSpcReduction="20000"/>
+          <a:bodyPr anchor="t">
+            <a:noAutofit/>
           </a:bodyPr>
           <a:lstStyle/>
           <a:p>
             <a:r>
-              <a:rPr lang="en-US" dirty="0">
+              <a:rPr lang="en-US" sz="2000" dirty="0">
                 <a:solidFill>
-                  <a:schemeClr val="accent1">
-                    <a:lumMod val="75000"/>
-                  </a:schemeClr>
+                  <a:srgbClr val="002060"/>
                 </a:solidFill>
               </a:rPr>
-              <a:t>Stock selection and feature engineering</a:t>
+              <a:t>Non-Stationary Model Selected to Model Data</a:t>
             </a:r>
           </a:p>
         </p:txBody>
@@ -12184,7 +12337,7 @@
           <p:cNvPr id="9" name="Content Placeholder 8">
             <a:extLst>
               <a:ext uri="{FF2B5EF4-FFF2-40B4-BE49-F238E27FC236}">
-                <a16:creationId xmlns:a16="http://schemas.microsoft.com/office/drawing/2014/main" id="{A720640E-8DB2-4C3B-9C72-311D5357D3ED}"/>
+                <a16:creationId xmlns:a16="http://schemas.microsoft.com/office/drawing/2014/main" xmlns="" id="{61897D86-FAD5-46ED-9675-9F4D2E6D682A}"/>
               </a:ext>
             </a:extLst>
           </p:cNvPr>
@@ -12197,201 +12350,6 @@
         </p:nvSpPr>
         <p:spPr>
           <a:xfrm>
-            <a:off x="5082073" y="2904931"/>
-            <a:ext cx="3490451" cy="3701142"/>
-          </a:xfrm>
-        </p:spPr>
-        <p:txBody>
-          <a:bodyPr>
-            <a:normAutofit/>
-          </a:bodyPr>
-          <a:lstStyle/>
-          <a:p>
-            <a:r>
-              <a:rPr lang="en-US" sz="1400" dirty="0"/>
-              <a:t>Stocks were iteratively selected by running a linear model on each stock</a:t>
-            </a:r>
-          </a:p>
-          <a:p>
-            <a:r>
-              <a:rPr lang="en-US" sz="1400" dirty="0"/>
-              <a:t>Stocks between $5 - $50 per share and displayed spectral densities with peaks at zero and no additional peaks thereafter were selected </a:t>
-            </a:r>
-          </a:p>
-          <a:p>
-            <a:r>
-              <a:rPr lang="en-US" sz="1400" dirty="0"/>
-              <a:t>Additionally spectral densities with exponentially damping behavior allowed us to identify ideal stocks for signal-plus-noise </a:t>
-            </a:r>
-          </a:p>
-          <a:p>
-            <a:r>
-              <a:rPr lang="en-US" sz="1400" dirty="0"/>
-              <a:t>Features were created to capture the variation between open/close and high/low prices</a:t>
-            </a:r>
-          </a:p>
-          <a:p>
-            <a:endParaRPr lang="en-US" dirty="0"/>
-          </a:p>
-          <a:p>
-            <a:endParaRPr lang="en-US" dirty="0"/>
-          </a:p>
-        </p:txBody>
-      </p:sp>
-    </p:spTree>
-    <p:extLst>
-      <p:ext uri="{BB962C8B-B14F-4D97-AF65-F5344CB8AC3E}">
-        <p14:creationId xmlns:p14="http://schemas.microsoft.com/office/powerpoint/2010/main" val="1435943376"/>
-      </p:ext>
-    </p:extLst>
-  </p:cSld>
-  <p:clrMapOvr>
-    <a:masterClrMapping/>
-  </p:clrMapOvr>
-</p:sld>
-</file>
-
-<file path=ppt/slides/slide5.xml><?xml version="1.0" encoding="utf-8"?>
-<p:sld xmlns:a="http://schemas.openxmlformats.org/drawingml/2006/main" xmlns:r="http://schemas.openxmlformats.org/officeDocument/2006/relationships" xmlns:p="http://schemas.openxmlformats.org/presentationml/2006/main">
-  <p:cSld>
-    <p:spTree>
-      <p:nvGrpSpPr>
-        <p:cNvPr id="1" name=""/>
-        <p:cNvGrpSpPr/>
-        <p:nvPr/>
-      </p:nvGrpSpPr>
-      <p:grpSpPr>
-        <a:xfrm>
-          <a:off x="0" y="0"/>
-          <a:ext cx="0" cy="0"/>
-          <a:chOff x="0" y="0"/>
-          <a:chExt cx="0" cy="0"/>
-        </a:xfrm>
-      </p:grpSpPr>
-      <p:sp>
-        <p:nvSpPr>
-          <p:cNvPr id="2" name="Title 1">
-            <a:extLst>
-              <a:ext uri="{FF2B5EF4-FFF2-40B4-BE49-F238E27FC236}">
-                <a16:creationId xmlns:a16="http://schemas.microsoft.com/office/drawing/2014/main" id="{37F7B9A7-F1BA-40D8-AAD5-15C8D6C4F544}"/>
-              </a:ext>
-            </a:extLst>
-          </p:cNvPr>
-          <p:cNvSpPr>
-            <a:spLocks noGrp="1"/>
-          </p:cNvSpPr>
-          <p:nvPr>
-            <p:ph type="title"/>
-          </p:nvPr>
-        </p:nvSpPr>
-        <p:spPr/>
-        <p:txBody>
-          <a:bodyPr/>
-          <a:lstStyle/>
-          <a:p>
-            <a:r>
-              <a:rPr lang="en-US" dirty="0"/>
-              <a:t>Model Type and Properties</a:t>
-            </a:r>
-          </a:p>
-        </p:txBody>
-      </p:sp>
-      <p:sp>
-        <p:nvSpPr>
-          <p:cNvPr id="6" name="Text Placeholder 5">
-            <a:extLst>
-              <a:ext uri="{FF2B5EF4-FFF2-40B4-BE49-F238E27FC236}">
-                <a16:creationId xmlns:a16="http://schemas.microsoft.com/office/drawing/2014/main" id="{5EE670F9-63B2-4A30-82F1-A21CB25126C9}"/>
-              </a:ext>
-            </a:extLst>
-          </p:cNvPr>
-          <p:cNvSpPr>
-            <a:spLocks noGrp="1"/>
-          </p:cNvSpPr>
-          <p:nvPr>
-            <p:ph type="body" idx="1"/>
-          </p:nvPr>
-        </p:nvSpPr>
-        <p:spPr>
-          <a:xfrm>
-            <a:off x="420528" y="4017646"/>
-            <a:ext cx="3868340" cy="627697"/>
-          </a:xfrm>
-        </p:spPr>
-        <p:txBody>
-          <a:bodyPr anchor="t">
-            <a:noAutofit/>
-          </a:bodyPr>
-          <a:lstStyle/>
-          <a:p>
-            <a:r>
-              <a:rPr lang="en-US" sz="2000" dirty="0">
-                <a:solidFill>
-                  <a:srgbClr val="002060"/>
-                </a:solidFill>
-              </a:rPr>
-              <a:t>Original Data Spectral Density and ACF</a:t>
-            </a:r>
-          </a:p>
-        </p:txBody>
-      </p:sp>
-      <p:sp>
-        <p:nvSpPr>
-          <p:cNvPr id="8" name="Text Placeholder 7">
-            <a:extLst>
-              <a:ext uri="{FF2B5EF4-FFF2-40B4-BE49-F238E27FC236}">
-                <a16:creationId xmlns:a16="http://schemas.microsoft.com/office/drawing/2014/main" id="{00FCA8AF-A1AF-4C36-BBAB-977C4EC38E30}"/>
-              </a:ext>
-            </a:extLst>
-          </p:cNvPr>
-          <p:cNvSpPr>
-            <a:spLocks noGrp="1"/>
-          </p:cNvSpPr>
-          <p:nvPr>
-            <p:ph type="body" sz="quarter" idx="3"/>
-          </p:nvPr>
-        </p:nvSpPr>
-        <p:spPr>
-          <a:xfrm>
-            <a:off x="420528" y="1627347"/>
-            <a:ext cx="3887391" cy="627697"/>
-          </a:xfrm>
-        </p:spPr>
-        <p:txBody>
-          <a:bodyPr anchor="t">
-            <a:noAutofit/>
-          </a:bodyPr>
-          <a:lstStyle/>
-          <a:p>
-            <a:r>
-              <a:rPr lang="en-US" sz="2000" dirty="0">
-                <a:solidFill>
-                  <a:srgbClr val="002060"/>
-                </a:solidFill>
-              </a:rPr>
-              <a:t>Non-Stationary Model Selected to Model Data</a:t>
-            </a:r>
-          </a:p>
-        </p:txBody>
-      </p:sp>
-      <p:sp>
-        <p:nvSpPr>
-          <p:cNvPr id="9" name="Content Placeholder 8">
-            <a:extLst>
-              <a:ext uri="{FF2B5EF4-FFF2-40B4-BE49-F238E27FC236}">
-                <a16:creationId xmlns:a16="http://schemas.microsoft.com/office/drawing/2014/main" id="{61897D86-FAD5-46ED-9675-9F4D2E6D682A}"/>
-              </a:ext>
-            </a:extLst>
-          </p:cNvPr>
-          <p:cNvSpPr>
-            <a:spLocks noGrp="1"/>
-          </p:cNvSpPr>
-          <p:nvPr>
-            <p:ph sz="quarter" idx="4"/>
-          </p:nvPr>
-        </p:nvSpPr>
-        <p:spPr>
-          <a:xfrm>
             <a:off x="422910" y="2255044"/>
             <a:ext cx="3887391" cy="1316036"/>
           </a:xfrm>
@@ -12426,7 +12384,7 @@
           <p:cNvPr id="11" name="Content Placeholder 8">
             <a:extLst>
               <a:ext uri="{FF2B5EF4-FFF2-40B4-BE49-F238E27FC236}">
-                <a16:creationId xmlns:a16="http://schemas.microsoft.com/office/drawing/2014/main" id="{7012AC7F-52F1-4F2E-A16B-723F2EA1012D}"/>
+                <a16:creationId xmlns:a16="http://schemas.microsoft.com/office/drawing/2014/main" xmlns="" id="{7012AC7F-52F1-4F2E-A16B-723F2EA1012D}"/>
               </a:ext>
             </a:extLst>
           </p:cNvPr>
@@ -12643,7 +12601,7 @@
           <p:cNvPr id="12" name="Content Placeholder 9">
             <a:extLst>
               <a:ext uri="{FF2B5EF4-FFF2-40B4-BE49-F238E27FC236}">
-                <a16:creationId xmlns:a16="http://schemas.microsoft.com/office/drawing/2014/main" id="{6277675D-EF7A-4281-983A-993972F3D502}"/>
+                <a16:creationId xmlns:a16="http://schemas.microsoft.com/office/drawing/2014/main" xmlns="" id="{6277675D-EF7A-4281-983A-993972F3D502}"/>
               </a:ext>
             </a:extLst>
           </p:cNvPr>
@@ -12721,6 +12679,198 @@
 </p:sld>
 </file>
 
+<file path=ppt/slides/slide5.xml><?xml version="1.0" encoding="utf-8"?>
+<p:sld xmlns:a="http://schemas.openxmlformats.org/drawingml/2006/main" xmlns:r="http://schemas.openxmlformats.org/officeDocument/2006/relationships" xmlns:p="http://schemas.openxmlformats.org/presentationml/2006/main">
+  <p:cSld>
+    <p:spTree>
+      <p:nvGrpSpPr>
+        <p:cNvPr id="1" name=""/>
+        <p:cNvGrpSpPr/>
+        <p:nvPr/>
+      </p:nvGrpSpPr>
+      <p:grpSpPr>
+        <a:xfrm>
+          <a:off x="0" y="0"/>
+          <a:ext cx="0" cy="0"/>
+          <a:chOff x="0" y="0"/>
+          <a:chExt cx="0" cy="0"/>
+        </a:xfrm>
+      </p:grpSpPr>
+      <p:sp>
+        <p:nvSpPr>
+          <p:cNvPr id="5" name="Title 4">
+            <a:extLst>
+              <a:ext uri="{FF2B5EF4-FFF2-40B4-BE49-F238E27FC236}">
+                <a16:creationId xmlns:a16="http://schemas.microsoft.com/office/drawing/2014/main" xmlns="" id="{5BF6937D-FA03-419D-8AF1-687DA1ADB403}"/>
+              </a:ext>
+            </a:extLst>
+          </p:cNvPr>
+          <p:cNvSpPr>
+            <a:spLocks noGrp="1"/>
+          </p:cNvSpPr>
+          <p:nvPr>
+            <p:ph type="title"/>
+          </p:nvPr>
+        </p:nvSpPr>
+        <p:spPr/>
+        <p:txBody>
+          <a:bodyPr/>
+          <a:lstStyle/>
+          <a:p>
+            <a:r>
+              <a:rPr lang="en-US" dirty="0"/>
+              <a:t>About the Data: </a:t>
+            </a:r>
+            <a:r>
+              <a:rPr lang="en-US" dirty="0" smtClean="0"/>
+              <a:t>Feature Engineering</a:t>
+            </a:r>
+            <a:endParaRPr lang="en-US" dirty="0"/>
+          </a:p>
+        </p:txBody>
+      </p:sp>
+      <p:pic>
+        <p:nvPicPr>
+          <p:cNvPr id="11" name="Content Placeholder 10" descr="A close up of a map&#10;&#10;Description automatically generated">
+            <a:extLst>
+              <a:ext uri="{FF2B5EF4-FFF2-40B4-BE49-F238E27FC236}">
+                <a16:creationId xmlns:a16="http://schemas.microsoft.com/office/drawing/2014/main" xmlns="" id="{22C41C69-3208-4AC6-BE0A-4C3360370BB9}"/>
+              </a:ext>
+            </a:extLst>
+          </p:cNvPr>
+          <p:cNvPicPr>
+            <a:picLocks noGrp="1" noChangeAspect="1"/>
+          </p:cNvPicPr>
+          <p:nvPr>
+            <p:ph sz="half" idx="2"/>
+          </p:nvPr>
+        </p:nvPicPr>
+        <p:blipFill>
+          <a:blip r:embed="rId3"/>
+          <a:stretch>
+            <a:fillRect/>
+          </a:stretch>
+        </p:blipFill>
+        <p:spPr>
+          <a:xfrm>
+            <a:off x="325438" y="2380667"/>
+            <a:ext cx="4424741" cy="2844476"/>
+          </a:xfrm>
+        </p:spPr>
+      </p:pic>
+      <p:sp>
+        <p:nvSpPr>
+          <p:cNvPr id="8" name="Text Placeholder 7">
+            <a:extLst>
+              <a:ext uri="{FF2B5EF4-FFF2-40B4-BE49-F238E27FC236}">
+                <a16:creationId xmlns:a16="http://schemas.microsoft.com/office/drawing/2014/main" xmlns="" id="{0BA0A838-3481-43C2-8535-FA48BEA08A33}"/>
+              </a:ext>
+            </a:extLst>
+          </p:cNvPr>
+          <p:cNvSpPr>
+            <a:spLocks noGrp="1"/>
+          </p:cNvSpPr>
+          <p:nvPr>
+            <p:ph type="body" sz="quarter" idx="3"/>
+          </p:nvPr>
+        </p:nvSpPr>
+        <p:spPr>
+          <a:xfrm>
+            <a:off x="5082073" y="2340527"/>
+            <a:ext cx="3490451" cy="508421"/>
+          </a:xfrm>
+        </p:spPr>
+        <p:txBody>
+          <a:bodyPr>
+            <a:normAutofit fontScale="92500" lnSpcReduction="10000"/>
+          </a:bodyPr>
+          <a:lstStyle/>
+          <a:p>
+            <a:r>
+              <a:rPr lang="en-US" dirty="0">
+                <a:solidFill>
+                  <a:schemeClr val="accent1">
+                    <a:lumMod val="75000"/>
+                  </a:schemeClr>
+                </a:solidFill>
+              </a:rPr>
+              <a:t>Stock selection and feature engineering</a:t>
+            </a:r>
+          </a:p>
+        </p:txBody>
+      </p:sp>
+      <p:sp>
+        <p:nvSpPr>
+          <p:cNvPr id="9" name="Content Placeholder 8">
+            <a:extLst>
+              <a:ext uri="{FF2B5EF4-FFF2-40B4-BE49-F238E27FC236}">
+                <a16:creationId xmlns:a16="http://schemas.microsoft.com/office/drawing/2014/main" xmlns="" id="{A720640E-8DB2-4C3B-9C72-311D5357D3ED}"/>
+              </a:ext>
+            </a:extLst>
+          </p:cNvPr>
+          <p:cNvSpPr>
+            <a:spLocks noGrp="1"/>
+          </p:cNvSpPr>
+          <p:nvPr>
+            <p:ph sz="quarter" idx="4"/>
+          </p:nvPr>
+        </p:nvSpPr>
+        <p:spPr>
+          <a:xfrm>
+            <a:off x="5082073" y="2904931"/>
+            <a:ext cx="3490451" cy="3701142"/>
+          </a:xfrm>
+        </p:spPr>
+        <p:txBody>
+          <a:bodyPr>
+            <a:normAutofit/>
+          </a:bodyPr>
+          <a:lstStyle/>
+          <a:p>
+            <a:r>
+              <a:rPr lang="en-US" sz="1400" dirty="0"/>
+              <a:t>Stocks were iteratively selected by running a linear model on each stock</a:t>
+            </a:r>
+          </a:p>
+          <a:p>
+            <a:r>
+              <a:rPr lang="en-US" sz="1400" dirty="0"/>
+              <a:t>Stocks between $5 - $50 per share and displayed spectral densities with peaks at zero and no additional peaks thereafter were selected </a:t>
+            </a:r>
+          </a:p>
+          <a:p>
+            <a:r>
+              <a:rPr lang="en-US" sz="1400" dirty="0"/>
+              <a:t>Additionally spectral densities with exponentially damping behavior allowed us to identify ideal stocks for signal-plus-noise </a:t>
+            </a:r>
+          </a:p>
+          <a:p>
+            <a:r>
+              <a:rPr lang="en-US" sz="1400" dirty="0"/>
+              <a:t>Features were created to capture the variation between open/close and high/low prices</a:t>
+            </a:r>
+          </a:p>
+          <a:p>
+            <a:endParaRPr lang="en-US" dirty="0"/>
+          </a:p>
+          <a:p>
+            <a:endParaRPr lang="en-US" dirty="0"/>
+          </a:p>
+        </p:txBody>
+      </p:sp>
+    </p:spTree>
+    <p:extLst>
+      <p:ext uri="{BB962C8B-B14F-4D97-AF65-F5344CB8AC3E}">
+        <p14:creationId xmlns:p14="http://schemas.microsoft.com/office/powerpoint/2010/main" val="1435943376"/>
+      </p:ext>
+    </p:extLst>
+  </p:cSld>
+  <p:clrMapOvr>
+    <a:masterClrMapping/>
+  </p:clrMapOvr>
+</p:sld>
+</file>
+
 <file path=ppt/slides/slide6.xml><?xml version="1.0" encoding="utf-8"?>
 <p:sld xmlns:a="http://schemas.openxmlformats.org/drawingml/2006/main" xmlns:r="http://schemas.openxmlformats.org/officeDocument/2006/relationships" xmlns:p="http://schemas.openxmlformats.org/presentationml/2006/main">
   <p:cSld>
@@ -12743,7 +12893,7 @@
           <p:cNvPr id="2" name="TextBox 1">
             <a:extLst>
               <a:ext uri="{FF2B5EF4-FFF2-40B4-BE49-F238E27FC236}">
-                <a16:creationId xmlns:a16="http://schemas.microsoft.com/office/drawing/2014/main" id="{584A9720-2FA1-426A-8DF9-D2B539518DE2}"/>
+                <a16:creationId xmlns:a16="http://schemas.microsoft.com/office/drawing/2014/main" xmlns="" id="{584A9720-2FA1-426A-8DF9-D2B539518DE2}"/>
               </a:ext>
             </a:extLst>
           </p:cNvPr>
@@ -12792,7 +12942,7 @@
           <p:cNvPr id="3" name="Title 2">
             <a:extLst>
               <a:ext uri="{FF2B5EF4-FFF2-40B4-BE49-F238E27FC236}">
-                <a16:creationId xmlns:a16="http://schemas.microsoft.com/office/drawing/2014/main" id="{36B254F5-DC72-4562-8F86-48E0452A25E2}"/>
+                <a16:creationId xmlns:a16="http://schemas.microsoft.com/office/drawing/2014/main" xmlns="" id="{36B254F5-DC72-4562-8F86-48E0452A25E2}"/>
               </a:ext>
             </a:extLst>
           </p:cNvPr>
@@ -12820,7 +12970,7 @@
           <p:cNvPr id="5" name="Table 5">
             <a:extLst>
               <a:ext uri="{FF2B5EF4-FFF2-40B4-BE49-F238E27FC236}">
-                <a16:creationId xmlns:a16="http://schemas.microsoft.com/office/drawing/2014/main" id="{75094937-6840-486D-ABDC-E998BCE66510}"/>
+                <a16:creationId xmlns:a16="http://schemas.microsoft.com/office/drawing/2014/main" xmlns="" id="{75094937-6840-486D-ABDC-E998BCE66510}"/>
               </a:ext>
             </a:extLst>
           </p:cNvPr>
@@ -12850,42 +13000,42 @@
                 <a:gridCol w="1095375">
                   <a:extLst>
                     <a:ext uri="{9D8B030D-6E8A-4147-A177-3AD203B41FA5}">
-                      <a16:colId xmlns:a16="http://schemas.microsoft.com/office/drawing/2014/main" val="3685785100"/>
+                      <a16:colId xmlns:a16="http://schemas.microsoft.com/office/drawing/2014/main" xmlns="" val="3685785100"/>
                     </a:ext>
                   </a:extLst>
                 </a:gridCol>
                 <a:gridCol w="1095375">
                   <a:extLst>
                     <a:ext uri="{9D8B030D-6E8A-4147-A177-3AD203B41FA5}">
-                      <a16:colId xmlns:a16="http://schemas.microsoft.com/office/drawing/2014/main" val="3097926865"/>
+                      <a16:colId xmlns:a16="http://schemas.microsoft.com/office/drawing/2014/main" xmlns="" val="3097926865"/>
                     </a:ext>
                   </a:extLst>
                 </a:gridCol>
                 <a:gridCol w="1095375">
                   <a:extLst>
                     <a:ext uri="{9D8B030D-6E8A-4147-A177-3AD203B41FA5}">
-                      <a16:colId xmlns:a16="http://schemas.microsoft.com/office/drawing/2014/main" val="167857884"/>
+                      <a16:colId xmlns:a16="http://schemas.microsoft.com/office/drawing/2014/main" xmlns="" val="167857884"/>
                     </a:ext>
                   </a:extLst>
                 </a:gridCol>
                 <a:gridCol w="1095375">
                   <a:extLst>
                     <a:ext uri="{9D8B030D-6E8A-4147-A177-3AD203B41FA5}">
-                      <a16:colId xmlns:a16="http://schemas.microsoft.com/office/drawing/2014/main" val="1669204363"/>
+                      <a16:colId xmlns:a16="http://schemas.microsoft.com/office/drawing/2014/main" xmlns="" val="1669204363"/>
                     </a:ext>
                   </a:extLst>
                 </a:gridCol>
                 <a:gridCol w="1095375">
                   <a:extLst>
                     <a:ext uri="{9D8B030D-6E8A-4147-A177-3AD203B41FA5}">
-                      <a16:colId xmlns:a16="http://schemas.microsoft.com/office/drawing/2014/main" val="317295960"/>
+                      <a16:colId xmlns:a16="http://schemas.microsoft.com/office/drawing/2014/main" xmlns="" val="317295960"/>
                     </a:ext>
                   </a:extLst>
                 </a:gridCol>
                 <a:gridCol w="1095375">
                   <a:extLst>
                     <a:ext uri="{9D8B030D-6E8A-4147-A177-3AD203B41FA5}">
-                      <a16:colId xmlns:a16="http://schemas.microsoft.com/office/drawing/2014/main" val="725248695"/>
+                      <a16:colId xmlns:a16="http://schemas.microsoft.com/office/drawing/2014/main" xmlns="" val="725248695"/>
                     </a:ext>
                   </a:extLst>
                 </a:gridCol>
@@ -13218,7 +13368,7 @@
                 </a:tc>
                 <a:extLst>
                   <a:ext uri="{0D108BD9-81ED-4DB2-BD59-A6C34878D82A}">
-                    <a16:rowId xmlns:a16="http://schemas.microsoft.com/office/drawing/2014/main" val="3869851288"/>
+                    <a16:rowId xmlns:a16="http://schemas.microsoft.com/office/drawing/2014/main" xmlns="" val="3869851288"/>
                   </a:ext>
                 </a:extLst>
               </a:tr>
@@ -13459,7 +13609,7 @@
                 </a:tc>
                 <a:extLst>
                   <a:ext uri="{0D108BD9-81ED-4DB2-BD59-A6C34878D82A}">
-                    <a16:rowId xmlns:a16="http://schemas.microsoft.com/office/drawing/2014/main" val="126189764"/>
+                    <a16:rowId xmlns:a16="http://schemas.microsoft.com/office/drawing/2014/main" xmlns="" val="126189764"/>
                   </a:ext>
                 </a:extLst>
               </a:tr>
@@ -13697,7 +13847,7 @@
                 </a:tc>
                 <a:extLst>
                   <a:ext uri="{0D108BD9-81ED-4DB2-BD59-A6C34878D82A}">
-                    <a16:rowId xmlns:a16="http://schemas.microsoft.com/office/drawing/2014/main" val="2792022408"/>
+                    <a16:rowId xmlns:a16="http://schemas.microsoft.com/office/drawing/2014/main" xmlns="" val="2792022408"/>
                   </a:ext>
                 </a:extLst>
               </a:tr>
@@ -13712,7 +13862,7 @@
               <p:cNvPr id="6" name="TextBox 5">
                 <a:extLst>
                   <a:ext uri="{FF2B5EF4-FFF2-40B4-BE49-F238E27FC236}">
-                    <a16:creationId xmlns:a16="http://schemas.microsoft.com/office/drawing/2014/main" id="{585634ED-C959-465E-A787-E0213EFB73EE}"/>
+                    <a16:creationId xmlns:a16="http://schemas.microsoft.com/office/drawing/2014/main" xmlns="" id="{585634ED-C959-465E-A787-E0213EFB73EE}"/>
                   </a:ext>
                 </a:extLst>
               </p:cNvPr>
@@ -14041,7 +14191,7 @@
               <p:cNvPr id="4" name="Table 3">
                 <a:extLst>
                   <a:ext uri="{FF2B5EF4-FFF2-40B4-BE49-F238E27FC236}">
-                    <a16:creationId xmlns:a16="http://schemas.microsoft.com/office/drawing/2014/main" id="{DE5DE65D-ED75-4953-B4EB-9A373B52B563}"/>
+                    <a16:creationId xmlns:a16="http://schemas.microsoft.com/office/drawing/2014/main" xmlns="" id="{DE5DE65D-ED75-4953-B4EB-9A373B52B563}"/>
                   </a:ext>
                 </a:extLst>
               </p:cNvPr>
@@ -14070,28 +14220,28 @@
                     <a:gridCol w="1095375">
                       <a:extLst>
                         <a:ext uri="{9D8B030D-6E8A-4147-A177-3AD203B41FA5}">
-                          <a16:colId xmlns:a16="http://schemas.microsoft.com/office/drawing/2014/main" val="3532746544"/>
+                          <a16:colId xmlns:a16="http://schemas.microsoft.com/office/drawing/2014/main" xmlns="" val="3532746544"/>
                         </a:ext>
                       </a:extLst>
                     </a:gridCol>
                     <a:gridCol w="1095375">
                       <a:extLst>
                         <a:ext uri="{9D8B030D-6E8A-4147-A177-3AD203B41FA5}">
-                          <a16:colId xmlns:a16="http://schemas.microsoft.com/office/drawing/2014/main" val="1706727873"/>
+                          <a16:colId xmlns:a16="http://schemas.microsoft.com/office/drawing/2014/main" xmlns="" val="1706727873"/>
                         </a:ext>
                       </a:extLst>
                     </a:gridCol>
                     <a:gridCol w="1095375">
                       <a:extLst>
                         <a:ext uri="{9D8B030D-6E8A-4147-A177-3AD203B41FA5}">
-                          <a16:colId xmlns:a16="http://schemas.microsoft.com/office/drawing/2014/main" val="283886444"/>
+                          <a16:colId xmlns:a16="http://schemas.microsoft.com/office/drawing/2014/main" xmlns="" val="283886444"/>
                         </a:ext>
                       </a:extLst>
                     </a:gridCol>
                     <a:gridCol w="1095375">
                       <a:extLst>
                         <a:ext uri="{9D8B030D-6E8A-4147-A177-3AD203B41FA5}">
-                          <a16:colId xmlns:a16="http://schemas.microsoft.com/office/drawing/2014/main" val="2793513210"/>
+                          <a16:colId xmlns:a16="http://schemas.microsoft.com/office/drawing/2014/main" xmlns="" val="2793513210"/>
                         </a:ext>
                       </a:extLst>
                     </a:gridCol>
@@ -14337,7 +14487,7 @@
                     </a:tc>
                     <a:extLst>
                       <a:ext uri="{0D108BD9-81ED-4DB2-BD59-A6C34878D82A}">
-                        <a16:rowId xmlns:a16="http://schemas.microsoft.com/office/drawing/2014/main" val="3297947004"/>
+                        <a16:rowId xmlns:a16="http://schemas.microsoft.com/office/drawing/2014/main" xmlns="" val="3297947004"/>
                       </a:ext>
                     </a:extLst>
                   </a:tr>
@@ -14523,7 +14673,7 @@
                     </a:tc>
                     <a:extLst>
                       <a:ext uri="{0D108BD9-81ED-4DB2-BD59-A6C34878D82A}">
-                        <a16:rowId xmlns:a16="http://schemas.microsoft.com/office/drawing/2014/main" val="3981636073"/>
+                        <a16:rowId xmlns:a16="http://schemas.microsoft.com/office/drawing/2014/main" xmlns="" val="3981636073"/>
                       </a:ext>
                     </a:extLst>
                   </a:tr>
@@ -14985,7 +15135,7 @@
           <p:cNvPr id="7" name="TextBox 6">
             <a:extLst>
               <a:ext uri="{FF2B5EF4-FFF2-40B4-BE49-F238E27FC236}">
-                <a16:creationId xmlns:a16="http://schemas.microsoft.com/office/drawing/2014/main" id="{2017A40A-F694-4351-9700-FAD367AF0898}"/>
+                <a16:creationId xmlns:a16="http://schemas.microsoft.com/office/drawing/2014/main" xmlns="" id="{2017A40A-F694-4351-9700-FAD367AF0898}"/>
               </a:ext>
             </a:extLst>
           </p:cNvPr>
@@ -15026,7 +15176,7 @@
           <p:cNvPr id="8" name="TextBox 7">
             <a:extLst>
               <a:ext uri="{FF2B5EF4-FFF2-40B4-BE49-F238E27FC236}">
-                <a16:creationId xmlns:a16="http://schemas.microsoft.com/office/drawing/2014/main" id="{935386F3-1344-4E54-AA4E-7B9A61B64E89}"/>
+                <a16:creationId xmlns:a16="http://schemas.microsoft.com/office/drawing/2014/main" xmlns="" id="{935386F3-1344-4E54-AA4E-7B9A61B64E89}"/>
               </a:ext>
             </a:extLst>
           </p:cNvPr>
@@ -15105,7 +15255,7 @@
           <p:cNvPr id="7" name="Title 6">
             <a:extLst>
               <a:ext uri="{FF2B5EF4-FFF2-40B4-BE49-F238E27FC236}">
-                <a16:creationId xmlns:a16="http://schemas.microsoft.com/office/drawing/2014/main" id="{580966E0-B910-493A-A936-DE1F47F53A14}"/>
+                <a16:creationId xmlns:a16="http://schemas.microsoft.com/office/drawing/2014/main" xmlns="" id="{580966E0-B910-493A-A936-DE1F47F53A14}"/>
               </a:ext>
             </a:extLst>
           </p:cNvPr>
@@ -15133,7 +15283,7 @@
           <p:cNvPr id="8" name="Text Placeholder 7">
             <a:extLst>
               <a:ext uri="{FF2B5EF4-FFF2-40B4-BE49-F238E27FC236}">
-                <a16:creationId xmlns:a16="http://schemas.microsoft.com/office/drawing/2014/main" id="{112BCD89-A140-49A7-BABD-61C56AFABDE6}"/>
+                <a16:creationId xmlns:a16="http://schemas.microsoft.com/office/drawing/2014/main" xmlns="" id="{112BCD89-A140-49A7-BABD-61C56AFABDE6}"/>
               </a:ext>
             </a:extLst>
           </p:cNvPr>
@@ -15174,7 +15324,7 @@
           <p:cNvPr id="13" name="Content Placeholder 12">
             <a:extLst>
               <a:ext uri="{FF2B5EF4-FFF2-40B4-BE49-F238E27FC236}">
-                <a16:creationId xmlns:a16="http://schemas.microsoft.com/office/drawing/2014/main" id="{C2C72000-A3ED-4D15-A859-94E8C2581C45}"/>
+                <a16:creationId xmlns:a16="http://schemas.microsoft.com/office/drawing/2014/main" xmlns="" id="{C2C72000-A3ED-4D15-A859-94E8C2581C45}"/>
               </a:ext>
             </a:extLst>
           </p:cNvPr>
@@ -15203,7 +15353,7 @@
           <p:cNvPr id="10" name="Text Placeholder 9">
             <a:extLst>
               <a:ext uri="{FF2B5EF4-FFF2-40B4-BE49-F238E27FC236}">
-                <a16:creationId xmlns:a16="http://schemas.microsoft.com/office/drawing/2014/main" id="{9EF8D5B9-3480-41D9-8A49-67AA2934B4F5}"/>
+                <a16:creationId xmlns:a16="http://schemas.microsoft.com/office/drawing/2014/main" xmlns="" id="{9EF8D5B9-3480-41D9-8A49-67AA2934B4F5}"/>
               </a:ext>
             </a:extLst>
           </p:cNvPr>
@@ -15222,7 +15372,7 @@
         </p:spPr>
         <p:txBody>
           <a:bodyPr>
-            <a:normAutofit fontScale="92500" lnSpcReduction="20000"/>
+            <a:normAutofit/>
           </a:bodyPr>
           <a:lstStyle/>
           <a:p>
@@ -15244,7 +15394,7 @@
           <p:cNvPr id="14" name="Text Placeholder 7">
             <a:extLst>
               <a:ext uri="{FF2B5EF4-FFF2-40B4-BE49-F238E27FC236}">
-                <a16:creationId xmlns:a16="http://schemas.microsoft.com/office/drawing/2014/main" id="{F6F9ABAA-7BD1-468A-96C3-D4FE556ABF71}"/>
+                <a16:creationId xmlns:a16="http://schemas.microsoft.com/office/drawing/2014/main" xmlns="" id="{F6F9ABAA-7BD1-468A-96C3-D4FE556ABF71}"/>
               </a:ext>
             </a:extLst>
           </p:cNvPr>
@@ -15449,7 +15599,7 @@
           <p:cNvPr id="21" name="Content Placeholder 20">
             <a:extLst>
               <a:ext uri="{FF2B5EF4-FFF2-40B4-BE49-F238E27FC236}">
-                <a16:creationId xmlns:a16="http://schemas.microsoft.com/office/drawing/2014/main" id="{837E7C69-9A77-4899-8F4B-00A299DFD7A2}"/>
+                <a16:creationId xmlns:a16="http://schemas.microsoft.com/office/drawing/2014/main" xmlns="" id="{837E7C69-9A77-4899-8F4B-00A299DFD7A2}"/>
               </a:ext>
             </a:extLst>
           </p:cNvPr>
@@ -15478,7 +15628,7 @@
           <p:cNvPr id="19" name="Content Placeholder 15">
             <a:extLst>
               <a:ext uri="{FF2B5EF4-FFF2-40B4-BE49-F238E27FC236}">
-                <a16:creationId xmlns:a16="http://schemas.microsoft.com/office/drawing/2014/main" id="{CDC1CF03-2E72-4079-AA5F-9269161319ED}"/>
+                <a16:creationId xmlns:a16="http://schemas.microsoft.com/office/drawing/2014/main" xmlns="" id="{CDC1CF03-2E72-4079-AA5F-9269161319ED}"/>
               </a:ext>
             </a:extLst>
           </p:cNvPr>
@@ -15508,7 +15658,7 @@
           <p:cNvPr id="23" name="Text Placeholder 9">
             <a:extLst>
               <a:ext uri="{FF2B5EF4-FFF2-40B4-BE49-F238E27FC236}">
-                <a16:creationId xmlns:a16="http://schemas.microsoft.com/office/drawing/2014/main" id="{D7BAA25A-D92F-49E1-B9BB-F3B42E9B9296}"/>
+                <a16:creationId xmlns:a16="http://schemas.microsoft.com/office/drawing/2014/main" xmlns="" id="{D7BAA25A-D92F-49E1-B9BB-F3B42E9B9296}"/>
               </a:ext>
             </a:extLst>
           </p:cNvPr>
@@ -15713,7 +15863,7 @@
           <p:cNvPr id="25" name="Picture 24">
             <a:extLst>
               <a:ext uri="{FF2B5EF4-FFF2-40B4-BE49-F238E27FC236}">
-                <a16:creationId xmlns:a16="http://schemas.microsoft.com/office/drawing/2014/main" id="{89E36B51-A543-4471-96D1-23296493FA13}"/>
+                <a16:creationId xmlns:a16="http://schemas.microsoft.com/office/drawing/2014/main" xmlns="" id="{89E36B51-A543-4471-96D1-23296493FA13}"/>
               </a:ext>
             </a:extLst>
           </p:cNvPr>
@@ -15781,7 +15931,7 @@
           <p:cNvPr id="3" name="Title 2">
             <a:extLst>
               <a:ext uri="{FF2B5EF4-FFF2-40B4-BE49-F238E27FC236}">
-                <a16:creationId xmlns:a16="http://schemas.microsoft.com/office/drawing/2014/main" id="{36B254F5-DC72-4562-8F86-48E0452A25E2}"/>
+                <a16:creationId xmlns:a16="http://schemas.microsoft.com/office/drawing/2014/main" xmlns="" id="{36B254F5-DC72-4562-8F86-48E0452A25E2}"/>
               </a:ext>
             </a:extLst>
           </p:cNvPr>
@@ -15809,7 +15959,7 @@
           <p:cNvPr id="20" name="Content Placeholder 19">
             <a:extLst>
               <a:ext uri="{FF2B5EF4-FFF2-40B4-BE49-F238E27FC236}">
-                <a16:creationId xmlns:a16="http://schemas.microsoft.com/office/drawing/2014/main" id="{E065D22F-007B-48A2-9B18-6FB4A54268BF}"/>
+                <a16:creationId xmlns:a16="http://schemas.microsoft.com/office/drawing/2014/main" xmlns="" id="{E065D22F-007B-48A2-9B18-6FB4A54268BF}"/>
               </a:ext>
             </a:extLst>
           </p:cNvPr>
@@ -15840,7 +15990,7 @@
               <p:cNvPr id="5" name="TextBox 4">
                 <a:extLst>
                   <a:ext uri="{FF2B5EF4-FFF2-40B4-BE49-F238E27FC236}">
-                    <a16:creationId xmlns:a16="http://schemas.microsoft.com/office/drawing/2014/main" id="{3474689A-2492-4977-8D08-62ECC552B6BC}"/>
+                    <a16:creationId xmlns:a16="http://schemas.microsoft.com/office/drawing/2014/main" xmlns="" id="{3474689A-2492-4977-8D08-62ECC552B6BC}"/>
                   </a:ext>
                 </a:extLst>
               </p:cNvPr>
@@ -16369,7 +16519,7 @@
           <p:cNvPr id="14" name="TextBox 13">
             <a:extLst>
               <a:ext uri="{FF2B5EF4-FFF2-40B4-BE49-F238E27FC236}">
-                <a16:creationId xmlns:a16="http://schemas.microsoft.com/office/drawing/2014/main" id="{870606B8-C12F-46AF-B9D8-9AF1EC6A42FD}"/>
+                <a16:creationId xmlns:a16="http://schemas.microsoft.com/office/drawing/2014/main" xmlns="" id="{870606B8-C12F-46AF-B9D8-9AF1EC6A42FD}"/>
               </a:ext>
             </a:extLst>
           </p:cNvPr>
@@ -16410,7 +16560,7 @@
           <p:cNvPr id="15" name="Content Placeholder 12">
             <a:extLst>
               <a:ext uri="{FF2B5EF4-FFF2-40B4-BE49-F238E27FC236}">
-                <a16:creationId xmlns:a16="http://schemas.microsoft.com/office/drawing/2014/main" id="{1CBC9CB4-64C3-46E6-988A-CBB4DD9966E0}"/>
+                <a16:creationId xmlns:a16="http://schemas.microsoft.com/office/drawing/2014/main" xmlns="" id="{1CBC9CB4-64C3-46E6-988A-CBB4DD9966E0}"/>
               </a:ext>
             </a:extLst>
           </p:cNvPr>
@@ -16440,7 +16590,7 @@
           <p:cNvPr id="16" name="TextBox 15">
             <a:extLst>
               <a:ext uri="{FF2B5EF4-FFF2-40B4-BE49-F238E27FC236}">
-                <a16:creationId xmlns:a16="http://schemas.microsoft.com/office/drawing/2014/main" id="{DA2B0F70-4708-4915-8448-AB68922AE50F}"/>
+                <a16:creationId xmlns:a16="http://schemas.microsoft.com/office/drawing/2014/main" xmlns="" id="{DA2B0F70-4708-4915-8448-AB68922AE50F}"/>
               </a:ext>
             </a:extLst>
           </p:cNvPr>
@@ -16481,7 +16631,7 @@
           <p:cNvPr id="21" name="TextBox 20">
             <a:extLst>
               <a:ext uri="{FF2B5EF4-FFF2-40B4-BE49-F238E27FC236}">
-                <a16:creationId xmlns:a16="http://schemas.microsoft.com/office/drawing/2014/main" id="{65B5E23A-65E7-4D94-B82E-5BAD8308D2E6}"/>
+                <a16:creationId xmlns:a16="http://schemas.microsoft.com/office/drawing/2014/main" xmlns="" id="{65B5E23A-65E7-4D94-B82E-5BAD8308D2E6}"/>
               </a:ext>
             </a:extLst>
           </p:cNvPr>
@@ -16522,7 +16672,7 @@
           <p:cNvPr id="23" name="Picture 22">
             <a:extLst>
               <a:ext uri="{FF2B5EF4-FFF2-40B4-BE49-F238E27FC236}">
-                <a16:creationId xmlns:a16="http://schemas.microsoft.com/office/drawing/2014/main" id="{E28582D7-57A5-4804-B589-134CA17D7A9E}"/>
+                <a16:creationId xmlns:a16="http://schemas.microsoft.com/office/drawing/2014/main" xmlns="" id="{E28582D7-57A5-4804-B589-134CA17D7A9E}"/>
               </a:ext>
             </a:extLst>
           </p:cNvPr>
@@ -16590,7 +16740,7 @@
           <p:cNvPr id="2" name="Title 1">
             <a:extLst>
               <a:ext uri="{FF2B5EF4-FFF2-40B4-BE49-F238E27FC236}">
-                <a16:creationId xmlns:a16="http://schemas.microsoft.com/office/drawing/2014/main" id="{D30D722C-C335-4C3D-899D-9CE0DC96BA4A}"/>
+                <a16:creationId xmlns:a16="http://schemas.microsoft.com/office/drawing/2014/main" xmlns="" id="{D30D722C-C335-4C3D-899D-9CE0DC96BA4A}"/>
               </a:ext>
             </a:extLst>
           </p:cNvPr>
@@ -16618,7 +16768,7 @@
           <p:cNvPr id="4" name="Content Placeholder 3">
             <a:extLst>
               <a:ext uri="{FF2B5EF4-FFF2-40B4-BE49-F238E27FC236}">
-                <a16:creationId xmlns:a16="http://schemas.microsoft.com/office/drawing/2014/main" id="{53B88FCD-A9E3-44A6-89F1-F8C4350B1344}"/>
+                <a16:creationId xmlns:a16="http://schemas.microsoft.com/office/drawing/2014/main" xmlns="" id="{53B88FCD-A9E3-44A6-89F1-F8C4350B1344}"/>
               </a:ext>
             </a:extLst>
           </p:cNvPr>
@@ -16676,7 +16826,7 @@
           <p:cNvPr id="5" name="Content Placeholder 4">
             <a:extLst>
               <a:ext uri="{FF2B5EF4-FFF2-40B4-BE49-F238E27FC236}">
-                <a16:creationId xmlns:a16="http://schemas.microsoft.com/office/drawing/2014/main" id="{ECA3F5A7-3262-493C-B9DD-84FAF6147F93}"/>
+                <a16:creationId xmlns:a16="http://schemas.microsoft.com/office/drawing/2014/main" xmlns="" id="{ECA3F5A7-3262-493C-B9DD-84FAF6147F93}"/>
               </a:ext>
             </a:extLst>
           </p:cNvPr>
@@ -16708,7 +16858,7 @@
           <p:cNvPr id="6" name="Oval 5">
             <a:extLst>
               <a:ext uri="{FF2B5EF4-FFF2-40B4-BE49-F238E27FC236}">
-                <a16:creationId xmlns:a16="http://schemas.microsoft.com/office/drawing/2014/main" id="{20A7F5F2-D7DB-4E2A-B9EE-EC6FE2C3A61D}"/>
+                <a16:creationId xmlns:a16="http://schemas.microsoft.com/office/drawing/2014/main" xmlns="" id="{20A7F5F2-D7DB-4E2A-B9EE-EC6FE2C3A61D}"/>
               </a:ext>
             </a:extLst>
           </p:cNvPr>
@@ -16761,7 +16911,7 @@
           <p:cNvPr id="7" name="TextBox 6">
             <a:extLst>
               <a:ext uri="{FF2B5EF4-FFF2-40B4-BE49-F238E27FC236}">
-                <a16:creationId xmlns:a16="http://schemas.microsoft.com/office/drawing/2014/main" id="{30D6E96C-0B81-4BD1-B85E-EAD1A1CFC245}"/>
+                <a16:creationId xmlns:a16="http://schemas.microsoft.com/office/drawing/2014/main" xmlns="" id="{30D6E96C-0B81-4BD1-B85E-EAD1A1CFC245}"/>
               </a:ext>
             </a:extLst>
           </p:cNvPr>

</xml_diff>